<commit_message>
almost final version in pptx
</commit_message>
<xml_diff>
--- a/presentation/Presentation ICCP.pptx
+++ b/presentation/Presentation ICCP.pptx
@@ -18,6 +18,7 @@
     <p:sldId id="265" r:id="rId13"/>
     <p:sldId id="266" r:id="rId14"/>
     <p:sldId id="267" r:id="rId15"/>
+    <p:sldId id="268" r:id="rId16"/>
   </p:sldIdLst>
   <p:sldSz cx="10080625" cy="7559675"/>
   <p:notesSz cx="7559675" cy="10691812"/>
@@ -75,7 +76,7 @@
         </p:nvSpPr>
         <p:spPr>
           <a:xfrm>
-            <a:off x="648000" y="288000"/>
+            <a:off x="720000" y="360000"/>
             <a:ext cx="8568000" cy="1440000"/>
           </a:xfrm>
           <a:prstGeom prst="rect">
@@ -101,7 +102,7 @@
         </p:nvSpPr>
         <p:spPr>
           <a:xfrm>
-            <a:off x="648000" y="1872000"/>
+            <a:off x="720000" y="1951200"/>
             <a:ext cx="8568000" cy="2091240"/>
           </a:xfrm>
           <a:prstGeom prst="rect">
@@ -127,7 +128,7 @@
         </p:nvSpPr>
         <p:spPr>
           <a:xfrm>
-            <a:off x="648000" y="4162320"/>
+            <a:off x="720000" y="4241520"/>
             <a:ext cx="8568000" cy="2091240"/>
           </a:xfrm>
           <a:prstGeom prst="rect">
@@ -175,7 +176,7 @@
         </p:nvSpPr>
         <p:spPr>
           <a:xfrm>
-            <a:off x="648000" y="288000"/>
+            <a:off x="720000" y="360000"/>
             <a:ext cx="8568000" cy="1440000"/>
           </a:xfrm>
           <a:prstGeom prst="rect">
@@ -201,7 +202,7 @@
         </p:nvSpPr>
         <p:spPr>
           <a:xfrm>
-            <a:off x="648000" y="1872000"/>
+            <a:off x="720000" y="1951200"/>
             <a:ext cx="4181040" cy="2091240"/>
           </a:xfrm>
           <a:prstGeom prst="rect">
@@ -227,7 +228,7 @@
         </p:nvSpPr>
         <p:spPr>
           <a:xfrm>
-            <a:off x="5038560" y="1872000"/>
+            <a:off x="5110560" y="1951200"/>
             <a:ext cx="4181040" cy="2091240"/>
           </a:xfrm>
           <a:prstGeom prst="rect">
@@ -253,7 +254,7 @@
         </p:nvSpPr>
         <p:spPr>
           <a:xfrm>
-            <a:off x="5038560" y="4162320"/>
+            <a:off x="5110560" y="4241520"/>
             <a:ext cx="4181040" cy="2091240"/>
           </a:xfrm>
           <a:prstGeom prst="rect">
@@ -279,7 +280,7 @@
         </p:nvSpPr>
         <p:spPr>
           <a:xfrm>
-            <a:off x="648000" y="4162320"/>
+            <a:off x="720000" y="4241520"/>
             <a:ext cx="4181040" cy="2091240"/>
           </a:xfrm>
           <a:prstGeom prst="rect">
@@ -327,7 +328,7 @@
         </p:nvSpPr>
         <p:spPr>
           <a:xfrm>
-            <a:off x="648000" y="288000"/>
+            <a:off x="720000" y="360000"/>
             <a:ext cx="8568000" cy="1440000"/>
           </a:xfrm>
           <a:prstGeom prst="rect">
@@ -353,7 +354,7 @@
         </p:nvSpPr>
         <p:spPr>
           <a:xfrm>
-            <a:off x="648000" y="1872000"/>
+            <a:off x="720000" y="1951200"/>
             <a:ext cx="8568000" cy="4384800"/>
           </a:xfrm>
           <a:prstGeom prst="rect">
@@ -379,7 +380,7 @@
         </p:nvSpPr>
         <p:spPr>
           <a:xfrm>
-            <a:off x="648000" y="1872000"/>
+            <a:off x="720000" y="1951200"/>
             <a:ext cx="8568000" cy="4384800"/>
           </a:xfrm>
           <a:prstGeom prst="rect">
@@ -405,7 +406,7 @@
         </p:blipFill>
         <p:spPr>
           <a:xfrm>
-            <a:off x="2184120" y="1872000"/>
+            <a:off x="2256120" y="1951200"/>
             <a:ext cx="5495400" cy="4384800"/>
           </a:xfrm>
           <a:prstGeom prst="rect">
@@ -428,7 +429,7 @@
         </p:blipFill>
         <p:spPr>
           <a:xfrm>
-            <a:off x="2184120" y="1872000"/>
+            <a:off x="2256120" y="1951200"/>
             <a:ext cx="5495400" cy="4384800"/>
           </a:xfrm>
           <a:prstGeom prst="rect">
@@ -495,7 +496,7 @@
         </p:nvSpPr>
         <p:spPr>
           <a:xfrm>
-            <a:off x="648000" y="288000"/>
+            <a:off x="720000" y="360000"/>
             <a:ext cx="8568000" cy="1440000"/>
           </a:xfrm>
           <a:prstGeom prst="rect">
@@ -521,7 +522,7 @@
         </p:nvSpPr>
         <p:spPr>
           <a:xfrm>
-            <a:off x="648000" y="1872000"/>
+            <a:off x="720000" y="1951200"/>
             <a:ext cx="8568000" cy="4384800"/>
           </a:xfrm>
           <a:prstGeom prst="rect">
@@ -570,7 +571,7 @@
         </p:nvSpPr>
         <p:spPr>
           <a:xfrm>
-            <a:off x="648000" y="288000"/>
+            <a:off x="720000" y="360000"/>
             <a:ext cx="8568000" cy="1440000"/>
           </a:xfrm>
           <a:prstGeom prst="rect">
@@ -596,7 +597,7 @@
         </p:nvSpPr>
         <p:spPr>
           <a:xfrm>
-            <a:off x="648000" y="1872000"/>
+            <a:off x="720000" y="1951200"/>
             <a:ext cx="8568000" cy="4384800"/>
           </a:xfrm>
           <a:prstGeom prst="rect">
@@ -644,7 +645,7 @@
         </p:nvSpPr>
         <p:spPr>
           <a:xfrm>
-            <a:off x="648000" y="288000"/>
+            <a:off x="720000" y="360000"/>
             <a:ext cx="8568000" cy="1440000"/>
           </a:xfrm>
           <a:prstGeom prst="rect">
@@ -670,7 +671,7 @@
         </p:nvSpPr>
         <p:spPr>
           <a:xfrm>
-            <a:off x="648000" y="1872000"/>
+            <a:off x="720000" y="1951200"/>
             <a:ext cx="4181040" cy="4384800"/>
           </a:xfrm>
           <a:prstGeom prst="rect">
@@ -696,7 +697,7 @@
         </p:nvSpPr>
         <p:spPr>
           <a:xfrm>
-            <a:off x="5038560" y="1872000"/>
+            <a:off x="5110560" y="1951200"/>
             <a:ext cx="4181040" cy="4384800"/>
           </a:xfrm>
           <a:prstGeom prst="rect">
@@ -744,7 +745,7 @@
         </p:nvSpPr>
         <p:spPr>
           <a:xfrm>
-            <a:off x="648000" y="288000"/>
+            <a:off x="720000" y="360000"/>
             <a:ext cx="8568000" cy="1440000"/>
           </a:xfrm>
           <a:prstGeom prst="rect">
@@ -792,7 +793,7 @@
         </p:nvSpPr>
         <p:spPr>
           <a:xfrm>
-            <a:off x="648000" y="288000"/>
+            <a:off x="720000" y="360000"/>
             <a:ext cx="8568000" cy="6676200"/>
           </a:xfrm>
           <a:prstGeom prst="rect">
@@ -841,7 +842,7 @@
         </p:nvSpPr>
         <p:spPr>
           <a:xfrm>
-            <a:off x="648000" y="288000"/>
+            <a:off x="720000" y="360000"/>
             <a:ext cx="8568000" cy="1440000"/>
           </a:xfrm>
           <a:prstGeom prst="rect">
@@ -867,7 +868,7 @@
         </p:nvSpPr>
         <p:spPr>
           <a:xfrm>
-            <a:off x="648000" y="1872000"/>
+            <a:off x="720000" y="1951200"/>
             <a:ext cx="4181040" cy="2091240"/>
           </a:xfrm>
           <a:prstGeom prst="rect">
@@ -893,7 +894,7 @@
         </p:nvSpPr>
         <p:spPr>
           <a:xfrm>
-            <a:off x="648000" y="4162320"/>
+            <a:off x="720000" y="4241520"/>
             <a:ext cx="4181040" cy="2091240"/>
           </a:xfrm>
           <a:prstGeom prst="rect">
@@ -919,7 +920,7 @@
         </p:nvSpPr>
         <p:spPr>
           <a:xfrm>
-            <a:off x="5038560" y="1872000"/>
+            <a:off x="5110560" y="1951200"/>
             <a:ext cx="4181040" cy="4384800"/>
           </a:xfrm>
           <a:prstGeom prst="rect">
@@ -967,7 +968,7 @@
         </p:nvSpPr>
         <p:spPr>
           <a:xfrm>
-            <a:off x="648000" y="288000"/>
+            <a:off x="720000" y="360000"/>
             <a:ext cx="8568000" cy="1440000"/>
           </a:xfrm>
           <a:prstGeom prst="rect">
@@ -993,7 +994,7 @@
         </p:nvSpPr>
         <p:spPr>
           <a:xfrm>
-            <a:off x="648000" y="1872000"/>
+            <a:off x="720000" y="1951200"/>
             <a:ext cx="8568000" cy="4384800"/>
           </a:xfrm>
           <a:prstGeom prst="rect">
@@ -1042,7 +1043,7 @@
         </p:nvSpPr>
         <p:spPr>
           <a:xfrm>
-            <a:off x="648000" y="288000"/>
+            <a:off x="720000" y="360000"/>
             <a:ext cx="8568000" cy="1440000"/>
           </a:xfrm>
           <a:prstGeom prst="rect">
@@ -1068,7 +1069,7 @@
         </p:nvSpPr>
         <p:spPr>
           <a:xfrm>
-            <a:off x="648000" y="1872000"/>
+            <a:off x="720000" y="1951200"/>
             <a:ext cx="4181040" cy="4384800"/>
           </a:xfrm>
           <a:prstGeom prst="rect">
@@ -1094,7 +1095,7 @@
         </p:nvSpPr>
         <p:spPr>
           <a:xfrm>
-            <a:off x="5038560" y="1872000"/>
+            <a:off x="5110560" y="1951200"/>
             <a:ext cx="4181040" cy="2091240"/>
           </a:xfrm>
           <a:prstGeom prst="rect">
@@ -1120,7 +1121,7 @@
         </p:nvSpPr>
         <p:spPr>
           <a:xfrm>
-            <a:off x="5038560" y="4162320"/>
+            <a:off x="5110560" y="4241520"/>
             <a:ext cx="4181040" cy="2091240"/>
           </a:xfrm>
           <a:prstGeom prst="rect">
@@ -1168,7 +1169,7 @@
         </p:nvSpPr>
         <p:spPr>
           <a:xfrm>
-            <a:off x="648000" y="288000"/>
+            <a:off x="720000" y="360000"/>
             <a:ext cx="8568000" cy="1440000"/>
           </a:xfrm>
           <a:prstGeom prst="rect">
@@ -1194,7 +1195,7 @@
         </p:nvSpPr>
         <p:spPr>
           <a:xfrm>
-            <a:off x="648000" y="1872000"/>
+            <a:off x="720000" y="1951200"/>
             <a:ext cx="4181040" cy="2091240"/>
           </a:xfrm>
           <a:prstGeom prst="rect">
@@ -1220,7 +1221,7 @@
         </p:nvSpPr>
         <p:spPr>
           <a:xfrm>
-            <a:off x="5038560" y="1872000"/>
+            <a:off x="5110560" y="1951200"/>
             <a:ext cx="4181040" cy="2091240"/>
           </a:xfrm>
           <a:prstGeom prst="rect">
@@ -1246,7 +1247,7 @@
         </p:nvSpPr>
         <p:spPr>
           <a:xfrm>
-            <a:off x="648000" y="4162320"/>
+            <a:off x="720000" y="4241520"/>
             <a:ext cx="8568000" cy="2091240"/>
           </a:xfrm>
           <a:prstGeom prst="rect">
@@ -1294,7 +1295,7 @@
         </p:nvSpPr>
         <p:spPr>
           <a:xfrm>
-            <a:off x="648000" y="288000"/>
+            <a:off x="720000" y="360000"/>
             <a:ext cx="8568000" cy="1440000"/>
           </a:xfrm>
           <a:prstGeom prst="rect">
@@ -1320,7 +1321,7 @@
         </p:nvSpPr>
         <p:spPr>
           <a:xfrm>
-            <a:off x="648000" y="1872000"/>
+            <a:off x="720000" y="1951200"/>
             <a:ext cx="8568000" cy="2091240"/>
           </a:xfrm>
           <a:prstGeom prst="rect">
@@ -1346,7 +1347,7 @@
         </p:nvSpPr>
         <p:spPr>
           <a:xfrm>
-            <a:off x="648000" y="4162320"/>
+            <a:off x="720000" y="4241520"/>
             <a:ext cx="8568000" cy="2091240"/>
           </a:xfrm>
           <a:prstGeom prst="rect">
@@ -1394,7 +1395,7 @@
         </p:nvSpPr>
         <p:spPr>
           <a:xfrm>
-            <a:off x="648000" y="288000"/>
+            <a:off x="720000" y="360000"/>
             <a:ext cx="8568000" cy="1440000"/>
           </a:xfrm>
           <a:prstGeom prst="rect">
@@ -1420,7 +1421,7 @@
         </p:nvSpPr>
         <p:spPr>
           <a:xfrm>
-            <a:off x="648000" y="1872000"/>
+            <a:off x="720000" y="1951200"/>
             <a:ext cx="4181040" cy="2091240"/>
           </a:xfrm>
           <a:prstGeom prst="rect">
@@ -1446,7 +1447,7 @@
         </p:nvSpPr>
         <p:spPr>
           <a:xfrm>
-            <a:off x="5038560" y="1872000"/>
+            <a:off x="5110560" y="1951200"/>
             <a:ext cx="4181040" cy="2091240"/>
           </a:xfrm>
           <a:prstGeom prst="rect">
@@ -1472,7 +1473,7 @@
         </p:nvSpPr>
         <p:spPr>
           <a:xfrm>
-            <a:off x="5038560" y="4162320"/>
+            <a:off x="5110560" y="4241520"/>
             <a:ext cx="4181040" cy="2091240"/>
           </a:xfrm>
           <a:prstGeom prst="rect">
@@ -1498,7 +1499,7 @@
         </p:nvSpPr>
         <p:spPr>
           <a:xfrm>
-            <a:off x="648000" y="4162320"/>
+            <a:off x="720000" y="4241520"/>
             <a:ext cx="4181040" cy="2091240"/>
           </a:xfrm>
           <a:prstGeom prst="rect">
@@ -1546,7 +1547,7 @@
         </p:nvSpPr>
         <p:spPr>
           <a:xfrm>
-            <a:off x="648000" y="288000"/>
+            <a:off x="720000" y="360000"/>
             <a:ext cx="8568000" cy="1440000"/>
           </a:xfrm>
           <a:prstGeom prst="rect">
@@ -1572,7 +1573,7 @@
         </p:nvSpPr>
         <p:spPr>
           <a:xfrm>
-            <a:off x="648000" y="1872000"/>
+            <a:off x="720000" y="1951200"/>
             <a:ext cx="8568000" cy="4384800"/>
           </a:xfrm>
           <a:prstGeom prst="rect">
@@ -1598,7 +1599,7 @@
         </p:nvSpPr>
         <p:spPr>
           <a:xfrm>
-            <a:off x="648000" y="1872000"/>
+            <a:off x="720000" y="1951200"/>
             <a:ext cx="8568000" cy="4384800"/>
           </a:xfrm>
           <a:prstGeom prst="rect">
@@ -1624,7 +1625,7 @@
         </p:blipFill>
         <p:spPr>
           <a:xfrm>
-            <a:off x="2184120" y="1872000"/>
+            <a:off x="2256120" y="1951200"/>
             <a:ext cx="5495400" cy="4384800"/>
           </a:xfrm>
           <a:prstGeom prst="rect">
@@ -1647,7 +1648,7 @@
         </p:blipFill>
         <p:spPr>
           <a:xfrm>
-            <a:off x="2184120" y="1872000"/>
+            <a:off x="2256120" y="1951200"/>
             <a:ext cx="5495400" cy="4384800"/>
           </a:xfrm>
           <a:prstGeom prst="rect">
@@ -1692,7 +1693,7 @@
         </p:nvSpPr>
         <p:spPr>
           <a:xfrm>
-            <a:off x="648000" y="288000"/>
+            <a:off x="720000" y="360000"/>
             <a:ext cx="8568000" cy="1440000"/>
           </a:xfrm>
           <a:prstGeom prst="rect">
@@ -1718,7 +1719,7 @@
         </p:nvSpPr>
         <p:spPr>
           <a:xfrm>
-            <a:off x="648000" y="1872000"/>
+            <a:off x="720000" y="1951200"/>
             <a:ext cx="8568000" cy="4384800"/>
           </a:xfrm>
           <a:prstGeom prst="rect">
@@ -1766,7 +1767,7 @@
         </p:nvSpPr>
         <p:spPr>
           <a:xfrm>
-            <a:off x="648000" y="288000"/>
+            <a:off x="720000" y="360000"/>
             <a:ext cx="8568000" cy="1440000"/>
           </a:xfrm>
           <a:prstGeom prst="rect">
@@ -1792,7 +1793,7 @@
         </p:nvSpPr>
         <p:spPr>
           <a:xfrm>
-            <a:off x="648000" y="1872000"/>
+            <a:off x="720000" y="1951200"/>
             <a:ext cx="4181040" cy="4384800"/>
           </a:xfrm>
           <a:prstGeom prst="rect">
@@ -1818,7 +1819,7 @@
         </p:nvSpPr>
         <p:spPr>
           <a:xfrm>
-            <a:off x="5038560" y="1872000"/>
+            <a:off x="5110560" y="1951200"/>
             <a:ext cx="4181040" cy="4384800"/>
           </a:xfrm>
           <a:prstGeom prst="rect">
@@ -1866,7 +1867,7 @@
         </p:nvSpPr>
         <p:spPr>
           <a:xfrm>
-            <a:off x="648000" y="288000"/>
+            <a:off x="720000" y="360000"/>
             <a:ext cx="8568000" cy="1440000"/>
           </a:xfrm>
           <a:prstGeom prst="rect">
@@ -1914,7 +1915,7 @@
         </p:nvSpPr>
         <p:spPr>
           <a:xfrm>
-            <a:off x="648000" y="288000"/>
+            <a:off x="720000" y="360000"/>
             <a:ext cx="8568000" cy="6676200"/>
           </a:xfrm>
           <a:prstGeom prst="rect">
@@ -1963,7 +1964,7 @@
         </p:nvSpPr>
         <p:spPr>
           <a:xfrm>
-            <a:off x="648000" y="288000"/>
+            <a:off x="720000" y="360000"/>
             <a:ext cx="8568000" cy="1440000"/>
           </a:xfrm>
           <a:prstGeom prst="rect">
@@ -1989,7 +1990,7 @@
         </p:nvSpPr>
         <p:spPr>
           <a:xfrm>
-            <a:off x="648000" y="1872000"/>
+            <a:off x="720000" y="1951200"/>
             <a:ext cx="4181040" cy="2091240"/>
           </a:xfrm>
           <a:prstGeom prst="rect">
@@ -2015,7 +2016,7 @@
         </p:nvSpPr>
         <p:spPr>
           <a:xfrm>
-            <a:off x="648000" y="4162320"/>
+            <a:off x="720000" y="4241520"/>
             <a:ext cx="4181040" cy="2091240"/>
           </a:xfrm>
           <a:prstGeom prst="rect">
@@ -2041,7 +2042,7 @@
         </p:nvSpPr>
         <p:spPr>
           <a:xfrm>
-            <a:off x="5038560" y="1872000"/>
+            <a:off x="5110560" y="1951200"/>
             <a:ext cx="4181040" cy="4384800"/>
           </a:xfrm>
           <a:prstGeom prst="rect">
@@ -2089,7 +2090,7 @@
         </p:nvSpPr>
         <p:spPr>
           <a:xfrm>
-            <a:off x="648000" y="288000"/>
+            <a:off x="720000" y="360000"/>
             <a:ext cx="8568000" cy="1440000"/>
           </a:xfrm>
           <a:prstGeom prst="rect">
@@ -2115,7 +2116,7 @@
         </p:nvSpPr>
         <p:spPr>
           <a:xfrm>
-            <a:off x="648000" y="1872000"/>
+            <a:off x="720000" y="1951200"/>
             <a:ext cx="4181040" cy="4384800"/>
           </a:xfrm>
           <a:prstGeom prst="rect">
@@ -2141,7 +2142,7 @@
         </p:nvSpPr>
         <p:spPr>
           <a:xfrm>
-            <a:off x="5038560" y="1872000"/>
+            <a:off x="5110560" y="1951200"/>
             <a:ext cx="4181040" cy="2091240"/>
           </a:xfrm>
           <a:prstGeom prst="rect">
@@ -2167,7 +2168,7 @@
         </p:nvSpPr>
         <p:spPr>
           <a:xfrm>
-            <a:off x="5038560" y="4162320"/>
+            <a:off x="5110560" y="4241520"/>
             <a:ext cx="4181040" cy="2091240"/>
           </a:xfrm>
           <a:prstGeom prst="rect">
@@ -2215,7 +2216,7 @@
         </p:nvSpPr>
         <p:spPr>
           <a:xfrm>
-            <a:off x="648000" y="288000"/>
+            <a:off x="720000" y="360000"/>
             <a:ext cx="8568000" cy="1440000"/>
           </a:xfrm>
           <a:prstGeom prst="rect">
@@ -2241,7 +2242,7 @@
         </p:nvSpPr>
         <p:spPr>
           <a:xfrm>
-            <a:off x="648000" y="1872000"/>
+            <a:off x="720000" y="1951200"/>
             <a:ext cx="4181040" cy="2091240"/>
           </a:xfrm>
           <a:prstGeom prst="rect">
@@ -2267,7 +2268,7 @@
         </p:nvSpPr>
         <p:spPr>
           <a:xfrm>
-            <a:off x="5038560" y="1872000"/>
+            <a:off x="5110560" y="1951200"/>
             <a:ext cx="4181040" cy="2091240"/>
           </a:xfrm>
           <a:prstGeom prst="rect">
@@ -2293,7 +2294,7 @@
         </p:nvSpPr>
         <p:spPr>
           <a:xfrm>
-            <a:off x="648000" y="4162320"/>
+            <a:off x="720000" y="4241520"/>
             <a:ext cx="8568000" cy="2091240"/>
           </a:xfrm>
           <a:prstGeom prst="rect">
@@ -2571,7 +2572,7 @@
           <a:bodyPr lIns="0" rIns="0" tIns="0" bIns="0"/>
           <a:p>
             <a:pPr algn="r"/>
-            <a:fld id="{459A09D8-D0C8-4ADB-B2F9-804DEFEA8B47}" type="slidenum">
+            <a:fld id="{CA82077C-3C80-4960-BBA5-1CF69ADB6BF1}" type="slidenum">
               <a:rPr lang="nl-NL" sz="1400">
                 <a:latin typeface="Times New Roman"/>
               </a:rPr>
@@ -2630,7 +2631,7 @@
         </p:nvSpPr>
         <p:spPr>
           <a:xfrm>
-            <a:off x="648000" y="288000"/>
+            <a:off x="720000" y="360000"/>
             <a:ext cx="8568000" cy="1440000"/>
           </a:xfrm>
           <a:prstGeom prst="rect">
@@ -2662,7 +2663,7 @@
         </p:nvSpPr>
         <p:spPr>
           <a:xfrm>
-            <a:off x="648000" y="1872000"/>
+            <a:off x="720000" y="1951200"/>
             <a:ext cx="8568000" cy="4384800"/>
           </a:xfrm>
           <a:prstGeom prst="rect">
@@ -2859,7 +2860,7 @@
           <a:bodyPr lIns="0" rIns="0" tIns="0" bIns="0"/>
           <a:p>
             <a:pPr algn="r"/>
-            <a:fld id="{6A53BB6F-78FE-4FBD-8EC5-E7565518D9E5}" type="slidenum">
+            <a:fld id="{C083ADB4-808F-4E31-B974-1506912037A3}" type="slidenum">
               <a:rPr lang="nl-NL" sz="1400">
                 <a:latin typeface="Open Sans"/>
               </a:rPr>
@@ -2875,7 +2876,7 @@
               <a:rPr lang="nl-NL" sz="1400">
                 <a:latin typeface="Open Sans"/>
               </a:rPr>
-              <a:t>12</a:t>
+              <a:t>13</a:t>
             </a:r>
             <a:endParaRPr/>
           </a:p>
@@ -2889,7 +2890,7 @@
         </p:nvSpPr>
         <p:spPr>
           <a:xfrm>
-            <a:off x="0" y="504000"/>
+            <a:off x="0" y="432000"/>
             <a:ext cx="504000" cy="1080000"/>
           </a:xfrm>
           <a:prstGeom prst="rect">
@@ -2980,7 +2981,7 @@
         </p:nvSpPr>
         <p:spPr>
           <a:xfrm>
-            <a:off x="648000" y="1872000"/>
+            <a:off x="720000" y="1951200"/>
             <a:ext cx="8568000" cy="4384800"/>
           </a:xfrm>
           <a:prstGeom prst="rect">
@@ -3050,13 +3051,13 @@
       </p:grpSpPr>
       <p:sp>
         <p:nvSpPr>
-          <p:cNvPr id="120" name="TextShape 1"/>
+          <p:cNvPr id="119" name="TextShape 1"/>
           <p:cNvSpPr txBox="1"/>
           <p:nvPr/>
         </p:nvSpPr>
         <p:spPr>
           <a:xfrm>
-            <a:off x="648000" y="288000"/>
+            <a:off x="720000" y="360000"/>
             <a:ext cx="8568000" cy="1440000"/>
           </a:xfrm>
           <a:prstGeom prst="rect">
@@ -3074,34 +3075,8 @@
               <a:rPr b="1" lang="nl-NL" sz="4800">
                 <a:latin typeface="Open Sans"/>
               </a:rPr>
-              <a:t>Sound check (one note)</a:t>
+              <a:t>Animation</a:t>
             </a:r>
-            <a:endParaRPr/>
-          </a:p>
-        </p:txBody>
-      </p:sp>
-      <p:sp>
-        <p:nvSpPr>
-          <p:cNvPr id="121" name="TextShape 2"/>
-          <p:cNvSpPr txBox="1"/>
-          <p:nvPr/>
-        </p:nvSpPr>
-        <p:spPr>
-          <a:xfrm>
-            <a:off x="648000" y="1872000"/>
-            <a:ext cx="8568000" cy="4384800"/>
-          </a:xfrm>
-          <a:prstGeom prst="rect">
-            <a:avLst/>
-          </a:prstGeom>
-          <a:noFill/>
-          <a:ln>
-            <a:noFill/>
-          </a:ln>
-        </p:spPr>
-        <p:txBody>
-          <a:bodyPr lIns="0" rIns="0" tIns="0" bIns="0"/>
-          <a:p>
             <a:endParaRPr/>
           </a:p>
         </p:txBody>
@@ -3111,10 +3086,10 @@
   <p:timing>
     <p:tnLst>
       <p:par>
-        <p:cTn id="59" dur="indefinite" restart="never" nodeType="tmRoot">
+        <p:cTn id="159" dur="indefinite" restart="never" nodeType="tmRoot">
           <p:childTnLst>
             <p:seq>
-              <p:cTn id="60" nodeType="mainSeq"/>
+              <p:cTn id="160" nodeType="mainSeq"/>
               <p:prevCondLst>
                 <p:cond delay="0" evt="onPrev">
                   <p:tgtEl>
@@ -3157,13 +3132,13 @@
       </p:grpSpPr>
       <p:sp>
         <p:nvSpPr>
-          <p:cNvPr id="122" name="TextShape 1"/>
+          <p:cNvPr id="120" name="TextShape 1"/>
           <p:cNvSpPr txBox="1"/>
           <p:nvPr/>
         </p:nvSpPr>
         <p:spPr>
           <a:xfrm>
-            <a:off x="648000" y="288000"/>
+            <a:off x="720000" y="360000"/>
             <a:ext cx="8568000" cy="1440000"/>
           </a:xfrm>
           <a:prstGeom prst="rect">
@@ -3181,7 +3156,7 @@
               <a:rPr b="1" lang="nl-NL" sz="4800">
                 <a:latin typeface="Open Sans"/>
               </a:rPr>
-              <a:t>Live piano</a:t>
+              <a:t>Sound check (one note)</a:t>
             </a:r>
             <a:endParaRPr/>
           </a:p>
@@ -3189,13 +3164,13 @@
       </p:sp>
       <p:sp>
         <p:nvSpPr>
-          <p:cNvPr id="123" name="TextShape 2"/>
+          <p:cNvPr id="121" name="TextShape 2"/>
           <p:cNvSpPr txBox="1"/>
           <p:nvPr/>
         </p:nvSpPr>
         <p:spPr>
           <a:xfrm>
-            <a:off x="648000" y="1872000"/>
+            <a:off x="720000" y="1951200"/>
             <a:ext cx="8568000" cy="4384800"/>
           </a:xfrm>
           <a:prstGeom prst="rect">
@@ -3218,10 +3193,10 @@
   <p:timing>
     <p:tnLst>
       <p:par>
-        <p:cTn id="61" dur="indefinite" restart="never" nodeType="tmRoot">
+        <p:cTn id="161" dur="indefinite" restart="never" nodeType="tmRoot">
           <p:childTnLst>
             <p:seq>
-              <p:cTn id="62" nodeType="mainSeq"/>
+              <p:cTn id="162" nodeType="mainSeq"/>
               <p:prevCondLst>
                 <p:cond delay="0" evt="onPrev">
                   <p:tgtEl>
@@ -3264,13 +3239,120 @@
       </p:grpSpPr>
       <p:sp>
         <p:nvSpPr>
+          <p:cNvPr id="122" name="TextShape 1"/>
+          <p:cNvSpPr txBox="1"/>
+          <p:nvPr/>
+        </p:nvSpPr>
+        <p:spPr>
+          <a:xfrm>
+            <a:off x="720000" y="360000"/>
+            <a:ext cx="8568000" cy="1440000"/>
+          </a:xfrm>
+          <a:prstGeom prst="rect">
+            <a:avLst/>
+          </a:prstGeom>
+          <a:noFill/>
+          <a:ln>
+            <a:noFill/>
+          </a:ln>
+        </p:spPr>
+        <p:txBody>
+          <a:bodyPr lIns="0" rIns="0" tIns="0" bIns="0" anchor="ctr"/>
+          <a:p>
+            <a:r>
+              <a:rPr b="1" lang="nl-NL" sz="4800">
+                <a:latin typeface="Open Sans"/>
+              </a:rPr>
+              <a:t>Live piano</a:t>
+            </a:r>
+            <a:endParaRPr/>
+          </a:p>
+        </p:txBody>
+      </p:sp>
+      <p:sp>
+        <p:nvSpPr>
+          <p:cNvPr id="123" name="TextShape 2"/>
+          <p:cNvSpPr txBox="1"/>
+          <p:nvPr/>
+        </p:nvSpPr>
+        <p:spPr>
+          <a:xfrm>
+            <a:off x="720000" y="1951200"/>
+            <a:ext cx="8568000" cy="4384800"/>
+          </a:xfrm>
+          <a:prstGeom prst="rect">
+            <a:avLst/>
+          </a:prstGeom>
+          <a:noFill/>
+          <a:ln>
+            <a:noFill/>
+          </a:ln>
+        </p:spPr>
+        <p:txBody>
+          <a:bodyPr lIns="0" rIns="0" tIns="0" bIns="0"/>
+          <a:p>
+            <a:endParaRPr/>
+          </a:p>
+        </p:txBody>
+      </p:sp>
+    </p:spTree>
+  </p:cSld>
+  <p:timing>
+    <p:tnLst>
+      <p:par>
+        <p:cTn id="163" dur="indefinite" restart="never" nodeType="tmRoot">
+          <p:childTnLst>
+            <p:seq>
+              <p:cTn id="164" nodeType="mainSeq"/>
+              <p:prevCondLst>
+                <p:cond delay="0" evt="onPrev">
+                  <p:tgtEl>
+                    <p:sldTgt/>
+                  </p:tgtEl>
+                </p:cond>
+              </p:prevCondLst>
+              <p:nextCondLst>
+                <p:cond delay="0" evt="onNext">
+                  <p:tgtEl>
+                    <p:sldTgt/>
+                  </p:tgtEl>
+                </p:cond>
+              </p:nextCondLst>
+            </p:seq>
+          </p:childTnLst>
+        </p:cTn>
+      </p:par>
+    </p:tnLst>
+  </p:timing>
+</p:sld>
+</file>
+
+<file path=ppt/slides/slide13.xml><?xml version="1.0" encoding="utf-8"?>
+<p:sld xmlns:a="http://schemas.openxmlformats.org/drawingml/2006/main" xmlns:p="http://schemas.openxmlformats.org/presentationml/2006/main" xmlns:r="http://schemas.openxmlformats.org/officeDocument/2006/relationships">
+  <p:cSld>
+    <p:spTree>
+      <p:nvGrpSpPr>
+        <p:cNvPr id="1" name=""/>
+        <p:cNvGrpSpPr/>
+        <p:nvPr/>
+      </p:nvGrpSpPr>
+      <p:grpSpPr>
+        <a:xfrm>
+          <a:off x="0" y="0"/>
+          <a:ext cx="0" cy="0"/>
+          <a:chOff x="0" y="0"/>
+          <a:chExt cx="0" cy="0"/>
+        </a:xfrm>
+      </p:grpSpPr>
+      <p:sp>
+        <p:nvSpPr>
           <p:cNvPr id="124" name="TextShape 1"/>
           <p:cNvSpPr txBox="1"/>
           <p:nvPr/>
         </p:nvSpPr>
         <p:spPr>
           <a:xfrm>
-            <a:off x="648000" y="288000"/>
+            <a:off x="720000" y="360000"/>
             <a:ext cx="8568000" cy="1440000"/>
           </a:xfrm>
           <a:prstGeom prst="rect">
@@ -3302,7 +3384,7 @@
         </p:nvSpPr>
         <p:spPr>
           <a:xfrm>
-            <a:off x="648000" y="1872000"/>
+            <a:off x="720000" y="1951200"/>
             <a:ext cx="8568000" cy="4384800"/>
           </a:xfrm>
           <a:prstGeom prst="rect">
@@ -3325,10 +3407,10 @@
   <p:timing>
     <p:tnLst>
       <p:par>
-        <p:cTn id="63" dur="indefinite" restart="never" nodeType="tmRoot">
+        <p:cTn id="165" dur="indefinite" restart="never" nodeType="tmRoot">
           <p:childTnLst>
             <p:seq>
-              <p:cTn id="64" nodeType="mainSeq"/>
+              <p:cTn id="166" nodeType="mainSeq"/>
               <p:prevCondLst>
                 <p:cond delay="0" evt="onPrev">
                   <p:tgtEl>
@@ -3377,7 +3459,7 @@
         </p:nvSpPr>
         <p:spPr>
           <a:xfrm>
-            <a:off x="648000" y="288000"/>
+            <a:off x="720000" y="360000"/>
             <a:ext cx="8568000" cy="1440000"/>
           </a:xfrm>
           <a:prstGeom prst="rect">
@@ -3409,7 +3491,7 @@
         </p:nvSpPr>
         <p:spPr>
           <a:xfrm>
-            <a:off x="648000" y="1872000"/>
+            <a:off x="720000" y="1951200"/>
             <a:ext cx="8568000" cy="4384800"/>
           </a:xfrm>
           <a:prstGeom prst="rect">
@@ -3423,6 +3505,73 @@
         <p:txBody>
           <a:bodyPr lIns="0" rIns="0" tIns="0" bIns="0"/>
           <a:p>
+            <a:pPr>
+              <a:buSzPct val="45000"/>
+              <a:buFont typeface="StarSymbol"/>
+              <a:buChar char=""/>
+            </a:pPr>
+            <a:r>
+              <a:rPr lang="nl-NL" sz="2400">
+                <a:latin typeface="Open Sans"/>
+              </a:rPr>
+              <a:t>Piano setup</a:t>
+            </a:r>
+            <a:endParaRPr/>
+          </a:p>
+          <a:p>
+            <a:pPr>
+              <a:buSzPct val="45000"/>
+              <a:buFont typeface="StarSymbol"/>
+              <a:buChar char=""/>
+            </a:pPr>
+            <a:r>
+              <a:rPr lang="nl-NL" sz="2400">
+                <a:latin typeface="Open Sans"/>
+              </a:rPr>
+              <a:t>Theory</a:t>
+            </a:r>
+            <a:endParaRPr/>
+          </a:p>
+          <a:p>
+            <a:pPr>
+              <a:buSzPct val="45000"/>
+              <a:buFont typeface="StarSymbol"/>
+              <a:buChar char=""/>
+            </a:pPr>
+            <a:r>
+              <a:rPr lang="nl-NL" sz="2400">
+                <a:latin typeface="Open Sans"/>
+              </a:rPr>
+              <a:t>Parameters involved</a:t>
+            </a:r>
+            <a:endParaRPr/>
+          </a:p>
+          <a:p>
+            <a:pPr>
+              <a:buSzPct val="45000"/>
+              <a:buFont typeface="StarSymbol"/>
+              <a:buChar char=""/>
+            </a:pPr>
+            <a:r>
+              <a:rPr lang="nl-NL" sz="2400">
+                <a:latin typeface="Open Sans"/>
+              </a:rPr>
+              <a:t>Plots</a:t>
+            </a:r>
+            <a:endParaRPr/>
+          </a:p>
+          <a:p>
+            <a:pPr>
+              <a:buSzPct val="45000"/>
+              <a:buFont typeface="StarSymbol"/>
+              <a:buChar char=""/>
+            </a:pPr>
+            <a:r>
+              <a:rPr lang="nl-NL" sz="2400">
+                <a:latin typeface="Open Sans"/>
+              </a:rPr>
+              <a:t>Play the piano!</a:t>
+            </a:r>
             <a:endParaRPr/>
           </a:p>
         </p:txBody>
@@ -3484,8 +3633,8 @@
         </p:nvSpPr>
         <p:spPr>
           <a:xfrm>
-            <a:off x="720000" y="300960"/>
-            <a:ext cx="8855640" cy="1262520"/>
+            <a:off x="720000" y="360000"/>
+            <a:ext cx="8568000" cy="1440000"/>
           </a:xfrm>
           <a:prstGeom prst="rect">
             <a:avLst/>
@@ -3520,7 +3669,7 @@
         </p:blipFill>
         <p:spPr>
           <a:xfrm>
-            <a:off x="0" y="2160000"/>
+            <a:off x="0" y="2159640"/>
             <a:ext cx="10079640" cy="2591640"/>
           </a:xfrm>
           <a:prstGeom prst="rect">
@@ -3533,45 +3682,13 @@
       </p:pic>
       <p:sp>
         <p:nvSpPr>
-          <p:cNvPr id="85" name="TextShape 2"/>
-          <p:cNvSpPr txBox="1"/>
-          <p:nvPr/>
-        </p:nvSpPr>
-        <p:spPr>
-          <a:xfrm>
-            <a:off x="3888000" y="7125480"/>
-            <a:ext cx="6192000" cy="434520"/>
-          </a:xfrm>
-          <a:prstGeom prst="rect">
-            <a:avLst/>
-          </a:prstGeom>
-          <a:noFill/>
-          <a:ln>
-            <a:noFill/>
-          </a:ln>
-        </p:spPr>
-        <p:txBody>
-          <a:bodyPr lIns="90000" rIns="90000" tIns="45000" bIns="45000"/>
-          <a:p>
-            <a:r>
-              <a:rPr lang="nl-NL" sz="1200">
-                <a:latin typeface="Arial"/>
-              </a:rPr>
-              <a:t>Saitis, Charalampos. Physical modelling of the piano: An investigation into the effect of string stiffness on the hammer-string interaction. Diss. Queen’s University Belfast, 2008.</a:t>
-            </a:r>
-            <a:endParaRPr/>
-          </a:p>
-        </p:txBody>
-      </p:sp>
-      <p:sp>
-        <p:nvSpPr>
-          <p:cNvPr id="86" name="Line 3"/>
+          <p:cNvPr id="85" name="Line 2"/>
           <p:cNvSpPr/>
           <p:nvPr/>
         </p:nvSpPr>
         <p:spPr>
           <a:xfrm>
-            <a:off x="576000" y="5256000"/>
+            <a:off x="576000" y="5255640"/>
             <a:ext cx="1368000" cy="0"/>
           </a:xfrm>
           <a:prstGeom prst="line">
@@ -3587,13 +3704,13 @@
       </p:sp>
       <p:sp>
         <p:nvSpPr>
-          <p:cNvPr id="87" name="Line 4"/>
+          <p:cNvPr id="86" name="Line 3"/>
           <p:cNvSpPr/>
           <p:nvPr/>
         </p:nvSpPr>
         <p:spPr>
           <a:xfrm flipV="1">
-            <a:off x="576000" y="4320000"/>
+            <a:off x="576000" y="4319640"/>
             <a:ext cx="0" cy="935640"/>
           </a:xfrm>
           <a:prstGeom prst="line">
@@ -3609,13 +3726,13 @@
       </p:sp>
       <p:sp>
         <p:nvSpPr>
-          <p:cNvPr id="88" name="TextShape 5"/>
+          <p:cNvPr id="87" name="TextShape 4"/>
           <p:cNvSpPr txBox="1"/>
           <p:nvPr/>
         </p:nvSpPr>
         <p:spPr>
           <a:xfrm>
-            <a:off x="1944000" y="5112000"/>
+            <a:off x="1944000" y="5111640"/>
             <a:ext cx="288000" cy="418320"/>
           </a:xfrm>
           <a:prstGeom prst="rect">
@@ -3641,13 +3758,13 @@
       </p:sp>
       <p:sp>
         <p:nvSpPr>
-          <p:cNvPr id="89" name="TextShape 6"/>
+          <p:cNvPr id="88" name="TextShape 5"/>
           <p:cNvSpPr txBox="1"/>
           <p:nvPr/>
         </p:nvSpPr>
         <p:spPr>
           <a:xfrm>
-            <a:off x="288000" y="4248000"/>
+            <a:off x="288000" y="4247640"/>
             <a:ext cx="360000" cy="490320"/>
           </a:xfrm>
           <a:prstGeom prst="rect">
@@ -3673,13 +3790,13 @@
       </p:sp>
       <p:sp>
         <p:nvSpPr>
-          <p:cNvPr id="90" name="Line 7"/>
+          <p:cNvPr id="89" name="Line 6"/>
           <p:cNvSpPr/>
           <p:nvPr/>
         </p:nvSpPr>
         <p:spPr>
           <a:xfrm flipV="1">
-            <a:off x="2520000" y="2736000"/>
+            <a:off x="2520000" y="2735640"/>
             <a:ext cx="0" cy="720000"/>
           </a:xfrm>
           <a:prstGeom prst="line">
@@ -3695,13 +3812,13 @@
       </p:sp>
       <p:sp>
         <p:nvSpPr>
-          <p:cNvPr id="91" name="TextShape 8"/>
+          <p:cNvPr id="90" name="TextShape 7"/>
           <p:cNvSpPr txBox="1"/>
           <p:nvPr/>
         </p:nvSpPr>
         <p:spPr>
           <a:xfrm>
-            <a:off x="2304000" y="2349720"/>
+            <a:off x="2304000" y="2349360"/>
             <a:ext cx="648000" cy="602280"/>
           </a:xfrm>
           <a:prstGeom prst="rect">
@@ -3783,13 +3900,13 @@
       </p:grpSpPr>
       <p:sp>
         <p:nvSpPr>
-          <p:cNvPr id="92" name="TextShape 1"/>
+          <p:cNvPr id="91" name="TextShape 1"/>
           <p:cNvSpPr txBox="1"/>
           <p:nvPr/>
         </p:nvSpPr>
         <p:spPr>
           <a:xfrm>
-            <a:off x="648000" y="288000"/>
+            <a:off x="720000" y="360000"/>
             <a:ext cx="8568000" cy="1440000"/>
           </a:xfrm>
           <a:prstGeom prst="rect">
@@ -3815,13 +3932,13 @@
       </p:sp>
       <p:sp>
         <p:nvSpPr>
-          <p:cNvPr id="93" name="TextShape 2"/>
+          <p:cNvPr id="92" name="TextShape 2"/>
           <p:cNvSpPr txBox="1"/>
           <p:nvPr/>
         </p:nvSpPr>
         <p:spPr>
           <a:xfrm>
-            <a:off x="648000" y="1872000"/>
+            <a:off x="720000" y="1951200"/>
             <a:ext cx="8568000" cy="4384800"/>
           </a:xfrm>
           <a:prstGeom prst="rect">
@@ -3898,7 +4015,7 @@
       </p:sp>
       <p:sp>
         <p:nvSpPr>
-          <p:cNvPr id="94" name="CustomShape 3"/>
+          <p:cNvPr id="93" name="CustomShape 3"/>
           <p:cNvSpPr/>
           <p:nvPr/>
         </p:nvSpPr>
@@ -3928,7 +4045,7 @@
       </p:sp>
       <p:sp>
         <p:nvSpPr>
-          <p:cNvPr id="95" name="TextShape 4"/>
+          <p:cNvPr id="94" name="TextShape 4"/>
           <p:cNvSpPr txBox="1"/>
           <p:nvPr/>
         </p:nvSpPr>
@@ -3960,7 +4077,7 @@
       </p:sp>
       <p:sp>
         <p:nvSpPr>
-          <p:cNvPr id="96" name="CustomShape 5"/>
+          <p:cNvPr id="95" name="CustomShape 5"/>
           <p:cNvSpPr/>
           <p:nvPr/>
         </p:nvSpPr>
@@ -3990,7 +4107,7 @@
       </p:sp>
       <p:sp>
         <p:nvSpPr>
-          <p:cNvPr id="97" name="TextShape 6"/>
+          <p:cNvPr id="96" name="TextShape 6"/>
           <p:cNvSpPr txBox="1"/>
           <p:nvPr/>
         </p:nvSpPr>
@@ -4022,7 +4139,7 @@
       </p:sp>
       <p:sp>
         <p:nvSpPr>
-          <p:cNvPr id="98" name="CustomShape 7"/>
+          <p:cNvPr id="97" name="CustomShape 7"/>
           <p:cNvSpPr/>
           <p:nvPr/>
         </p:nvSpPr>
@@ -4052,7 +4169,7 @@
       </p:sp>
       <p:sp>
         <p:nvSpPr>
-          <p:cNvPr id="99" name="TextShape 8"/>
+          <p:cNvPr id="98" name="TextShape 8"/>
           <p:cNvSpPr txBox="1"/>
           <p:nvPr/>
         </p:nvSpPr>
@@ -4084,7 +4201,7 @@
       </p:sp>
       <p:sp>
         <p:nvSpPr>
-          <p:cNvPr id="100" name="TextShape 9"/>
+          <p:cNvPr id="99" name="TextShape 9"/>
           <p:cNvSpPr txBox="1"/>
           <p:nvPr/>
         </p:nvSpPr>
@@ -4150,7 +4267,11 @@
                                           </p:stCondLst>
                                         </p:cTn>
                                         <p:tgtEl>
-                                          <p:spTgt spid="-1"/>
+                                          <p:spTgt spid="92">
+                                            <p:txEl>
+                                              <p:pRg st="0" end="35"/>
+                                            </p:txEl>
+                                          </p:spTgt>
                                         </p:tgtEl>
                                         <p:attrNameLst>
                                           <p:attrName>style.visibility</p:attrName>
@@ -4208,25 +4329,39 @@
                                   </p:childTnLst>
                                 </p:cTn>
                               </p:par>
+                            </p:childTnLst>
+                          </p:cTn>
+                        </p:par>
+                      </p:childTnLst>
+                    </p:cTn>
+                  </p:par>
+                  <p:par>
+                    <p:cTn id="17" fill="freeze">
+                      <p:stCondLst>
+                        <p:cond delay="indefinite"/>
+                      </p:stCondLst>
+                      <p:childTnLst>
+                        <p:par>
+                          <p:cTn id="18" fill="freeze">
+                            <p:stCondLst>
+                              <p:cond delay="0"/>
+                            </p:stCondLst>
+                            <p:childTnLst>
                               <p:par>
-                                <p:cTn id="17" nodeType="withEffect" fill="hold" presetClass="entr" presetID="1">
+                                <p:cTn id="19" nodeType="clickEffect" fill="hold" presetClass="entr" presetID="1">
                                   <p:stCondLst>
                                     <p:cond delay="0"/>
                                   </p:stCondLst>
                                   <p:childTnLst>
                                     <p:set>
                                       <p:cBhvr>
-                                        <p:cTn id="18" dur="1" fill="hold">
+                                        <p:cTn id="20" dur="1" fill="hold">
                                           <p:stCondLst>
                                             <p:cond delay="0"/>
                                           </p:stCondLst>
                                         </p:cTn>
                                         <p:tgtEl>
-                                          <p:spTgt spid="95">
-                                            <p:txEl>
-                                              <p:pRg st="0" end="23"/>
-                                            </p:txEl>
-                                          </p:spTgt>
+                                          <p:spTgt spid="-1"/>
                                         </p:tgtEl>
                                         <p:attrNameLst>
                                           <p:attrName>style.visibility</p:attrName>
@@ -4239,26 +4374,8 @@
                                   </p:childTnLst>
                                 </p:cTn>
                               </p:par>
-                            </p:childTnLst>
-                          </p:cTn>
-                        </p:par>
-                      </p:childTnLst>
-                    </p:cTn>
-                  </p:par>
-                  <p:par>
-                    <p:cTn id="19" fill="freeze">
-                      <p:stCondLst>
-                        <p:cond delay="indefinite"/>
-                      </p:stCondLst>
-                      <p:childTnLst>
-                        <p:par>
-                          <p:cTn id="20" fill="freeze">
-                            <p:stCondLst>
-                              <p:cond delay="0"/>
-                            </p:stCondLst>
-                            <p:childTnLst>
                               <p:par>
-                                <p:cTn id="21" nodeType="clickEffect" fill="hold" presetClass="exit" presetID="1">
+                                <p:cTn id="21" nodeType="withEffect" fill="hold" presetClass="entr" presetID="1">
                                   <p:stCondLst>
                                     <p:cond delay="0"/>
                                   </p:stCondLst>
@@ -4271,14 +4388,18 @@
                                           </p:stCondLst>
                                         </p:cTn>
                                         <p:tgtEl>
-                                          <p:spTgt spid="94"/>
+                                          <p:spTgt spid="94">
+                                            <p:txEl>
+                                              <p:pRg st="0" end="23"/>
+                                            </p:txEl>
+                                          </p:spTgt>
                                         </p:tgtEl>
                                         <p:attrNameLst>
                                           <p:attrName>style.visibility</p:attrName>
                                         </p:attrNameLst>
                                       </p:cBhvr>
                                       <p:to>
-                                        <p:strVal val="hidden"/>
+                                        <p:strVal val="visible"/>
                                       </p:to>
                                     </p:set>
                                   </p:childTnLst>
@@ -4303,7 +4424,7 @@
                             </p:stCondLst>
                             <p:childTnLst>
                               <p:par>
-                                <p:cTn id="25" nodeType="clickEffect" fill="hold" presetClass="entr" presetID="1">
+                                <p:cTn id="25" nodeType="clickEffect" fill="hold" presetClass="exit" presetID="1">
                                   <p:stCondLst>
                                     <p:cond delay="0"/>
                                   </p:stCondLst>
@@ -4311,6 +4432,51 @@
                                     <p:set>
                                       <p:cBhvr>
                                         <p:cTn id="26" dur="1" fill="hold">
+                                          <p:stCondLst>
+                                            <p:cond delay="0"/>
+                                          </p:stCondLst>
+                                        </p:cTn>
+                                        <p:tgtEl>
+                                          <p:spTgt spid="93"/>
+                                        </p:tgtEl>
+                                        <p:attrNameLst>
+                                          <p:attrName>style.visibility</p:attrName>
+                                        </p:attrNameLst>
+                                      </p:cBhvr>
+                                      <p:to>
+                                        <p:strVal val="hidden"/>
+                                      </p:to>
+                                    </p:set>
+                                  </p:childTnLst>
+                                </p:cTn>
+                              </p:par>
+                            </p:childTnLst>
+                          </p:cTn>
+                        </p:par>
+                      </p:childTnLst>
+                    </p:cTn>
+                  </p:par>
+                  <p:par>
+                    <p:cTn id="27" fill="freeze">
+                      <p:stCondLst>
+                        <p:cond delay="indefinite"/>
+                      </p:stCondLst>
+                      <p:childTnLst>
+                        <p:par>
+                          <p:cTn id="28" fill="freeze">
+                            <p:stCondLst>
+                              <p:cond delay="0"/>
+                            </p:stCondLst>
+                            <p:childTnLst>
+                              <p:par>
+                                <p:cTn id="29" nodeType="clickEffect" fill="hold" presetClass="entr" presetID="1">
+                                  <p:stCondLst>
+                                    <p:cond delay="0"/>
+                                  </p:stCondLst>
+                                  <p:childTnLst>
+                                    <p:set>
+                                      <p:cBhvr>
+                                        <p:cTn id="30" dur="1" fill="hold">
                                           <p:stCondLst>
                                             <p:cond delay="0"/>
                                           </p:stCondLst>
@@ -4330,56 +4496,7 @@
                                 </p:cTn>
                               </p:par>
                               <p:par>
-                                <p:cTn id="27" nodeType="withEffect" fill="hold" presetClass="entr" presetID="1">
-                                  <p:stCondLst>
-                                    <p:cond delay="0"/>
-                                  </p:stCondLst>
-                                  <p:childTnLst>
-                                    <p:set>
-                                      <p:cBhvr>
-                                        <p:cTn id="28" dur="1" fill="hold">
-                                          <p:stCondLst>
-                                            <p:cond delay="0"/>
-                                          </p:stCondLst>
-                                        </p:cTn>
-                                        <p:tgtEl>
-                                          <p:spTgt spid="97">
-                                            <p:txEl>
-                                              <p:pRg st="0" end="15"/>
-                                            </p:txEl>
-                                          </p:spTgt>
-                                        </p:tgtEl>
-                                        <p:attrNameLst>
-                                          <p:attrName>style.visibility</p:attrName>
-                                        </p:attrNameLst>
-                                      </p:cBhvr>
-                                      <p:to>
-                                        <p:strVal val="visible"/>
-                                      </p:to>
-                                    </p:set>
-                                  </p:childTnLst>
-                                </p:cTn>
-                              </p:par>
-                            </p:childTnLst>
-                          </p:cTn>
-                        </p:par>
-                      </p:childTnLst>
-                    </p:cTn>
-                  </p:par>
-                  <p:par>
-                    <p:cTn id="29" fill="freeze">
-                      <p:stCondLst>
-                        <p:cond delay="indefinite"/>
-                      </p:stCondLst>
-                      <p:childTnLst>
-                        <p:par>
-                          <p:cTn id="30" fill="freeze">
-                            <p:stCondLst>
-                              <p:cond delay="0"/>
-                            </p:stCondLst>
-                            <p:childTnLst>
-                              <p:par>
-                                <p:cTn id="31" nodeType="clickEffect" fill="hold" presetClass="exit" presetID="1">
+                                <p:cTn id="31" nodeType="withEffect" fill="hold" presetClass="entr" presetID="1">
                                   <p:stCondLst>
                                     <p:cond delay="0"/>
                                   </p:stCondLst>
@@ -4392,14 +4509,18 @@
                                           </p:stCondLst>
                                         </p:cTn>
                                         <p:tgtEl>
-                                          <p:spTgt spid="96"/>
+                                          <p:spTgt spid="96">
+                                            <p:txEl>
+                                              <p:pRg st="0" end="15"/>
+                                            </p:txEl>
+                                          </p:spTgt>
                                         </p:tgtEl>
                                         <p:attrNameLst>
                                           <p:attrName>style.visibility</p:attrName>
                                         </p:attrNameLst>
                                       </p:cBhvr>
                                       <p:to>
-                                        <p:strVal val="hidden"/>
+                                        <p:strVal val="visible"/>
                                       </p:to>
                                     </p:set>
                                   </p:childTnLst>
@@ -4424,7 +4545,7 @@
                             </p:stCondLst>
                             <p:childTnLst>
                               <p:par>
-                                <p:cTn id="35" nodeType="clickEffect" fill="hold" presetClass="entr" presetID="1">
+                                <p:cTn id="35" nodeType="clickEffect" fill="hold" presetClass="exit" presetID="1">
                                   <p:stCondLst>
                                     <p:cond delay="0"/>
                                   </p:stCondLst>
@@ -4432,6 +4553,51 @@
                                     <p:set>
                                       <p:cBhvr>
                                         <p:cTn id="36" dur="1" fill="hold">
+                                          <p:stCondLst>
+                                            <p:cond delay="0"/>
+                                          </p:stCondLst>
+                                        </p:cTn>
+                                        <p:tgtEl>
+                                          <p:spTgt spid="95"/>
+                                        </p:tgtEl>
+                                        <p:attrNameLst>
+                                          <p:attrName>style.visibility</p:attrName>
+                                        </p:attrNameLst>
+                                      </p:cBhvr>
+                                      <p:to>
+                                        <p:strVal val="hidden"/>
+                                      </p:to>
+                                    </p:set>
+                                  </p:childTnLst>
+                                </p:cTn>
+                              </p:par>
+                            </p:childTnLst>
+                          </p:cTn>
+                        </p:par>
+                      </p:childTnLst>
+                    </p:cTn>
+                  </p:par>
+                  <p:par>
+                    <p:cTn id="37" fill="freeze">
+                      <p:stCondLst>
+                        <p:cond delay="indefinite"/>
+                      </p:stCondLst>
+                      <p:childTnLst>
+                        <p:par>
+                          <p:cTn id="38" fill="freeze">
+                            <p:stCondLst>
+                              <p:cond delay="0"/>
+                            </p:stCondLst>
+                            <p:childTnLst>
+                              <p:par>
+                                <p:cTn id="39" nodeType="clickEffect" fill="hold" presetClass="entr" presetID="1">
+                                  <p:stCondLst>
+                                    <p:cond delay="0"/>
+                                  </p:stCondLst>
+                                  <p:childTnLst>
+                                    <p:set>
+                                      <p:cBhvr>
+                                        <p:cTn id="40" dur="1" fill="hold">
                                           <p:stCondLst>
                                             <p:cond delay="0"/>
                                           </p:stCondLst>
@@ -4451,14 +4617,131 @@
                                 </p:cTn>
                               </p:par>
                               <p:par>
-                                <p:cTn id="37" nodeType="withEffect" fill="hold" presetClass="entr" presetID="1">
+                                <p:cTn id="41" nodeType="withEffect" fill="hold" presetClass="entr" presetID="1">
                                   <p:stCondLst>
                                     <p:cond delay="0"/>
                                   </p:stCondLst>
                                   <p:childTnLst>
                                     <p:set>
                                       <p:cBhvr>
-                                        <p:cTn id="38" dur="1" fill="hold">
+                                        <p:cTn id="42" dur="1" fill="hold">
+                                          <p:stCondLst>
+                                            <p:cond delay="0"/>
+                                          </p:stCondLst>
+                                        </p:cTn>
+                                        <p:tgtEl>
+                                          <p:spTgt spid="98"/>
+                                        </p:tgtEl>
+                                        <p:attrNameLst>
+                                          <p:attrName>style.visibility</p:attrName>
+                                        </p:attrNameLst>
+                                      </p:cBhvr>
+                                      <p:to>
+                                        <p:strVal val="visible"/>
+                                      </p:to>
+                                    </p:set>
+                                  </p:childTnLst>
+                                </p:cTn>
+                              </p:par>
+                            </p:childTnLst>
+                          </p:cTn>
+                        </p:par>
+                      </p:childTnLst>
+                    </p:cTn>
+                  </p:par>
+                  <p:par>
+                    <p:cTn id="43" fill="freeze">
+                      <p:stCondLst>
+                        <p:cond delay="indefinite"/>
+                      </p:stCondLst>
+                      <p:childTnLst>
+                        <p:par>
+                          <p:cTn id="44" fill="freeze">
+                            <p:stCondLst>
+                              <p:cond delay="0"/>
+                            </p:stCondLst>
+                            <p:childTnLst>
+                              <p:par>
+                                <p:cTn id="45" nodeType="clickEffect" fill="hold" presetClass="exit" presetID="1">
+                                  <p:stCondLst>
+                                    <p:cond delay="0"/>
+                                  </p:stCondLst>
+                                  <p:childTnLst>
+                                    <p:set>
+                                      <p:cBhvr>
+                                        <p:cTn id="46" dur="1" fill="hold">
+                                          <p:stCondLst>
+                                            <p:cond delay="0"/>
+                                          </p:stCondLst>
+                                        </p:cTn>
+                                        <p:tgtEl>
+                                          <p:spTgt spid="97"/>
+                                        </p:tgtEl>
+                                        <p:attrNameLst>
+                                          <p:attrName>style.visibility</p:attrName>
+                                        </p:attrNameLst>
+                                      </p:cBhvr>
+                                      <p:to>
+                                        <p:strVal val="hidden"/>
+                                      </p:to>
+                                    </p:set>
+                                  </p:childTnLst>
+                                </p:cTn>
+                              </p:par>
+                            </p:childTnLst>
+                          </p:cTn>
+                        </p:par>
+                      </p:childTnLst>
+                    </p:cTn>
+                  </p:par>
+                  <p:par>
+                    <p:cTn id="47" fill="freeze">
+                      <p:stCondLst>
+                        <p:cond delay="indefinite"/>
+                      </p:stCondLst>
+                      <p:childTnLst>
+                        <p:par>
+                          <p:cTn id="48" fill="freeze">
+                            <p:stCondLst>
+                              <p:cond delay="0"/>
+                            </p:stCondLst>
+                            <p:childTnLst>
+                              <p:par>
+                                <p:cTn id="49" nodeType="clickEffect" fill="hold" presetClass="entr" presetID="1">
+                                  <p:stCondLst>
+                                    <p:cond delay="0"/>
+                                  </p:stCondLst>
+                                  <p:childTnLst>
+                                    <p:set>
+                                      <p:cBhvr>
+                                        <p:cTn id="50" dur="1" fill="hold">
+                                          <p:stCondLst>
+                                            <p:cond delay="0"/>
+                                          </p:stCondLst>
+                                        </p:cTn>
+                                        <p:tgtEl>
+                                          <p:spTgt spid="-1"/>
+                                        </p:tgtEl>
+                                        <p:attrNameLst>
+                                          <p:attrName>style.visibility</p:attrName>
+                                        </p:attrNameLst>
+                                      </p:cBhvr>
+                                      <p:to>
+                                        <p:strVal val="visible"/>
+                                      </p:to>
+                                    </p:set>
+                                  </p:childTnLst>
+                                </p:cTn>
+                              </p:par>
+                              <p:par>
+                                <p:cTn id="51" nodeType="withEffect" fill="hold" presetClass="entr" presetID="1">
+                                  <p:stCondLst>
+                                    <p:cond delay="0"/>
+                                  </p:stCondLst>
+                                  <p:childTnLst>
+                                    <p:set>
+                                      <p:cBhvr>
+                                        <p:cTn id="52" dur="1" fill="hold">
                                           <p:stCondLst>
                                             <p:cond delay="0"/>
                                           </p:stCondLst>
@@ -4484,39 +4767,43 @@
                     </p:cTn>
                   </p:par>
                   <p:par>
-                    <p:cTn id="39" fill="freeze">
+                    <p:cTn id="53" fill="freeze">
                       <p:stCondLst>
                         <p:cond delay="indefinite"/>
                       </p:stCondLst>
                       <p:childTnLst>
                         <p:par>
-                          <p:cTn id="40" fill="freeze">
+                          <p:cTn id="54" fill="freeze">
                             <p:stCondLst>
                               <p:cond delay="0"/>
                             </p:stCondLst>
                             <p:childTnLst>
                               <p:par>
-                                <p:cTn id="41" nodeType="clickEffect" fill="hold" presetClass="exit" presetID="1">
+                                <p:cTn id="55" nodeType="clickEffect" fill="hold" presetClass="entr" presetID="1">
                                   <p:stCondLst>
                                     <p:cond delay="0"/>
                                   </p:stCondLst>
                                   <p:childTnLst>
                                     <p:set>
                                       <p:cBhvr>
-                                        <p:cTn id="42" dur="1" fill="hold">
+                                        <p:cTn id="56" dur="1" fill="hold">
                                           <p:stCondLst>
                                             <p:cond delay="0"/>
                                           </p:stCondLst>
                                         </p:cTn>
                                         <p:tgtEl>
-                                          <p:spTgt spid="98"/>
+                                          <p:spTgt spid="92">
+                                            <p:txEl>
+                                              <p:pRg st="39" end="61"/>
+                                            </p:txEl>
+                                          </p:spTgt>
                                         </p:tgtEl>
                                         <p:attrNameLst>
                                           <p:attrName>style.visibility</p:attrName>
                                         </p:attrNameLst>
                                       </p:cBhvr>
                                       <p:to>
-                                        <p:strVal val="hidden"/>
+                                        <p:strVal val="visible"/>
                                       </p:to>
                                     </p:set>
                                   </p:childTnLst>
@@ -4529,59 +4816,32 @@
                     </p:cTn>
                   </p:par>
                   <p:par>
-                    <p:cTn id="43" fill="freeze">
+                    <p:cTn id="57" fill="freeze">
                       <p:stCondLst>
                         <p:cond delay="indefinite"/>
                       </p:stCondLst>
                       <p:childTnLst>
                         <p:par>
-                          <p:cTn id="44" fill="freeze">
+                          <p:cTn id="58" fill="freeze">
                             <p:stCondLst>
                               <p:cond delay="0"/>
                             </p:stCondLst>
                             <p:childTnLst>
                               <p:par>
-                                <p:cTn id="45" nodeType="clickEffect" fill="hold" presetClass="entr" presetID="1">
+                                <p:cTn id="59" nodeType="clickEffect" fill="hold" presetClass="entr" presetID="1">
                                   <p:stCondLst>
                                     <p:cond delay="0"/>
                                   </p:stCondLst>
                                   <p:childTnLst>
                                     <p:set>
                                       <p:cBhvr>
-                                        <p:cTn id="46" dur="1" fill="hold">
+                                        <p:cTn id="60" dur="1" fill="hold">
                                           <p:stCondLst>
                                             <p:cond delay="0"/>
                                           </p:stCondLst>
                                         </p:cTn>
                                         <p:tgtEl>
                                           <p:spTgt spid="-1"/>
-                                        </p:tgtEl>
-                                        <p:attrNameLst>
-                                          <p:attrName>style.visibility</p:attrName>
-                                        </p:attrNameLst>
-                                      </p:cBhvr>
-                                      <p:to>
-                                        <p:strVal val="visible"/>
-                                      </p:to>
-                                    </p:set>
-                                  </p:childTnLst>
-                                </p:cTn>
-                              </p:par>
-                              <p:par>
-                                <p:cTn id="47" nodeType="withEffect" fill="hold" presetClass="entr" presetID="1">
-                                  <p:stCondLst>
-                                    <p:cond delay="0"/>
-                                  </p:stCondLst>
-                                  <p:childTnLst>
-                                    <p:set>
-                                      <p:cBhvr>
-                                        <p:cTn id="48" dur="1" fill="hold">
-                                          <p:stCondLst>
-                                            <p:cond delay="0"/>
-                                          </p:stCondLst>
-                                        </p:cTn>
-                                        <p:tgtEl>
-                                          <p:spTgt spid="100"/>
                                         </p:tgtEl>
                                         <p:attrNameLst>
                                           <p:attrName>style.visibility</p:attrName>
@@ -4644,7 +4904,7 @@
       </p:grpSpPr>
       <p:sp>
         <p:nvSpPr>
-          <p:cNvPr id="101" name="CustomShape 1"/>
+          <p:cNvPr id="100" name="CustomShape 1"/>
           <p:cNvSpPr/>
           <p:nvPr/>
         </p:nvSpPr>
@@ -4675,7 +4935,7 @@
       </p:sp>
       <p:sp>
         <p:nvSpPr>
-          <p:cNvPr id="102" name="CustomShape 2"/>
+          <p:cNvPr id="101" name="CustomShape 2"/>
           <p:cNvSpPr/>
           <p:nvPr/>
         </p:nvSpPr>
@@ -4706,13 +4966,13 @@
       </p:sp>
       <p:sp>
         <p:nvSpPr>
-          <p:cNvPr id="103" name="TextShape 3"/>
+          <p:cNvPr id="102" name="TextShape 3"/>
           <p:cNvSpPr txBox="1"/>
           <p:nvPr/>
         </p:nvSpPr>
         <p:spPr>
           <a:xfrm>
-            <a:off x="648000" y="288000"/>
+            <a:off x="720000" y="360000"/>
             <a:ext cx="8568000" cy="1440000"/>
           </a:xfrm>
           <a:prstGeom prst="rect">
@@ -4738,13 +4998,13 @@
       </p:sp>
       <p:sp>
         <p:nvSpPr>
-          <p:cNvPr id="104" name="TextShape 4"/>
+          <p:cNvPr id="103" name="TextShape 4"/>
           <p:cNvSpPr txBox="1"/>
           <p:nvPr/>
         </p:nvSpPr>
         <p:spPr>
           <a:xfrm>
-            <a:off x="648000" y="1872000"/>
+            <a:off x="720000" y="1951200"/>
             <a:ext cx="8568000" cy="4384800"/>
           </a:xfrm>
           <a:prstGeom prst="rect">
@@ -4805,29 +5065,7 @@
       </p:sp>
       <p:sp>
         <p:nvSpPr>
-          <p:cNvPr id="105" name="Line 5"/>
-          <p:cNvSpPr/>
-          <p:nvPr/>
-        </p:nvSpPr>
-        <p:spPr>
-          <a:xfrm flipV="1">
-            <a:off x="1944000" y="5472000"/>
-            <a:ext cx="720000" cy="864000"/>
-          </a:xfrm>
-          <a:prstGeom prst="line">
-            <a:avLst/>
-          </a:prstGeom>
-          <a:ln>
-            <a:solidFill>
-              <a:srgbClr val="000000"/>
-            </a:solidFill>
-            <a:tailEnd len="med" type="triangle" w="med"/>
-          </a:ln>
-        </p:spPr>
-      </p:sp>
-      <p:sp>
-        <p:nvSpPr>
-          <p:cNvPr id="106" name="TextShape 6"/>
+          <p:cNvPr id="104" name="TextShape 5"/>
           <p:cNvSpPr txBox="1"/>
           <p:nvPr/>
         </p:nvSpPr>
@@ -4859,29 +5097,7 @@
       </p:sp>
       <p:sp>
         <p:nvSpPr>
-          <p:cNvPr id="107" name="Line 7"/>
-          <p:cNvSpPr/>
-          <p:nvPr/>
-        </p:nvSpPr>
-        <p:spPr>
-          <a:xfrm flipH="1" flipV="1">
-            <a:off x="7344000" y="5544000"/>
-            <a:ext cx="216000" cy="432000"/>
-          </a:xfrm>
-          <a:prstGeom prst="line">
-            <a:avLst/>
-          </a:prstGeom>
-          <a:ln>
-            <a:solidFill>
-              <a:srgbClr val="000000"/>
-            </a:solidFill>
-            <a:tailEnd len="med" type="triangle" w="med"/>
-          </a:ln>
-        </p:spPr>
-      </p:sp>
-      <p:sp>
-        <p:nvSpPr>
-          <p:cNvPr id="108" name="TextShape 8"/>
+          <p:cNvPr id="105" name="TextShape 6"/>
           <p:cNvSpPr txBox="1"/>
           <p:nvPr/>
         </p:nvSpPr>
@@ -4916,10 +5132,399 @@
   <p:timing>
     <p:tnLst>
       <p:par>
-        <p:cTn id="49" dur="indefinite" restart="never" nodeType="tmRoot">
+        <p:cTn id="61" dur="indefinite" restart="never" nodeType="tmRoot">
           <p:childTnLst>
             <p:seq>
-              <p:cTn id="50" nodeType="mainSeq"/>
+              <p:cTn id="62" nodeType="mainSeq">
+                <p:childTnLst>
+                  <p:par>
+                    <p:cTn id="63" fill="freeze">
+                      <p:stCondLst>
+                        <p:cond delay="indefinite"/>
+                      </p:stCondLst>
+                      <p:childTnLst>
+                        <p:par>
+                          <p:cTn id="64" fill="freeze">
+                            <p:stCondLst>
+                              <p:cond delay="0"/>
+                            </p:stCondLst>
+                            <p:childTnLst>
+                              <p:par>
+                                <p:cTn id="65" nodeType="clickEffect" fill="hold" presetClass="entr" presetID="1">
+                                  <p:stCondLst>
+                                    <p:cond delay="0"/>
+                                  </p:stCondLst>
+                                  <p:childTnLst>
+                                    <p:set>
+                                      <p:cBhvr>
+                                        <p:cTn id="66" dur="1" fill="hold">
+                                          <p:stCondLst>
+                                            <p:cond delay="0"/>
+                                          </p:stCondLst>
+                                        </p:cTn>
+                                        <p:tgtEl>
+                                          <p:spTgt spid="103">
+                                            <p:txEl>
+                                              <p:pRg st="0" end="14"/>
+                                            </p:txEl>
+                                          </p:spTgt>
+                                        </p:tgtEl>
+                                        <p:attrNameLst>
+                                          <p:attrName>style.visibility</p:attrName>
+                                        </p:attrNameLst>
+                                      </p:cBhvr>
+                                      <p:to>
+                                        <p:strVal val="visible"/>
+                                      </p:to>
+                                    </p:set>
+                                  </p:childTnLst>
+                                </p:cTn>
+                              </p:par>
+                            </p:childTnLst>
+                          </p:cTn>
+                        </p:par>
+                      </p:childTnLst>
+                    </p:cTn>
+                  </p:par>
+                  <p:par>
+                    <p:cTn id="67" fill="freeze">
+                      <p:stCondLst>
+                        <p:cond delay="indefinite"/>
+                      </p:stCondLst>
+                      <p:childTnLst>
+                        <p:par>
+                          <p:cTn id="68" fill="freeze">
+                            <p:stCondLst>
+                              <p:cond delay="0"/>
+                            </p:stCondLst>
+                            <p:childTnLst>
+                              <p:par>
+                                <p:cTn id="69" nodeType="clickEffect" fill="hold" presetClass="entr" presetID="1">
+                                  <p:stCondLst>
+                                    <p:cond delay="0"/>
+                                  </p:stCondLst>
+                                  <p:childTnLst>
+                                    <p:set>
+                                      <p:cBhvr>
+                                        <p:cTn id="70" dur="1" fill="hold">
+                                          <p:stCondLst>
+                                            <p:cond delay="0"/>
+                                          </p:stCondLst>
+                                        </p:cTn>
+                                        <p:tgtEl>
+                                          <p:spTgt spid="-1"/>
+                                        </p:tgtEl>
+                                        <p:attrNameLst>
+                                          <p:attrName>style.visibility</p:attrName>
+                                        </p:attrNameLst>
+                                      </p:cBhvr>
+                                      <p:to>
+                                        <p:strVal val="visible"/>
+                                      </p:to>
+                                    </p:set>
+                                  </p:childTnLst>
+                                </p:cTn>
+                              </p:par>
+                            </p:childTnLst>
+                          </p:cTn>
+                        </p:par>
+                      </p:childTnLst>
+                    </p:cTn>
+                  </p:par>
+                  <p:par>
+                    <p:cTn id="71" fill="freeze">
+                      <p:stCondLst>
+                        <p:cond delay="indefinite"/>
+                      </p:stCondLst>
+                      <p:childTnLst>
+                        <p:par>
+                          <p:cTn id="72" fill="freeze">
+                            <p:stCondLst>
+                              <p:cond delay="0"/>
+                            </p:stCondLst>
+                            <p:childTnLst>
+                              <p:par>
+                                <p:cTn id="73" nodeType="clickEffect" fill="hold" presetClass="entr" presetID="1">
+                                  <p:stCondLst>
+                                    <p:cond delay="0"/>
+                                  </p:stCondLst>
+                                  <p:childTnLst>
+                                    <p:set>
+                                      <p:cBhvr>
+                                        <p:cTn id="74" dur="1" fill="hold">
+                                          <p:stCondLst>
+                                            <p:cond delay="0"/>
+                                          </p:stCondLst>
+                                        </p:cTn>
+                                        <p:tgtEl>
+                                          <p:spTgt spid="103">
+                                            <p:txEl>
+                                              <p:pRg st="16" end="48"/>
+                                            </p:txEl>
+                                          </p:spTgt>
+                                        </p:tgtEl>
+                                        <p:attrNameLst>
+                                          <p:attrName>style.visibility</p:attrName>
+                                        </p:attrNameLst>
+                                      </p:cBhvr>
+                                      <p:to>
+                                        <p:strVal val="visible"/>
+                                      </p:to>
+                                    </p:set>
+                                  </p:childTnLst>
+                                </p:cTn>
+                              </p:par>
+                            </p:childTnLst>
+                          </p:cTn>
+                        </p:par>
+                      </p:childTnLst>
+                    </p:cTn>
+                  </p:par>
+                  <p:par>
+                    <p:cTn id="75" fill="freeze">
+                      <p:stCondLst>
+                        <p:cond delay="indefinite"/>
+                      </p:stCondLst>
+                      <p:childTnLst>
+                        <p:par>
+                          <p:cTn id="76" fill="freeze">
+                            <p:stCondLst>
+                              <p:cond delay="0"/>
+                            </p:stCondLst>
+                            <p:childTnLst>
+                              <p:par>
+                                <p:cTn id="77" nodeType="clickEffect" fill="hold" presetClass="entr" presetID="1">
+                                  <p:stCondLst>
+                                    <p:cond delay="0"/>
+                                  </p:stCondLst>
+                                  <p:childTnLst>
+                                    <p:set>
+                                      <p:cBhvr>
+                                        <p:cTn id="78" dur="1" fill="hold">
+                                          <p:stCondLst>
+                                            <p:cond delay="0"/>
+                                          </p:stCondLst>
+                                        </p:cTn>
+                                        <p:tgtEl>
+                                          <p:spTgt spid="-1"/>
+                                        </p:tgtEl>
+                                        <p:attrNameLst>
+                                          <p:attrName>style.visibility</p:attrName>
+                                        </p:attrNameLst>
+                                      </p:cBhvr>
+                                      <p:to>
+                                        <p:strVal val="visible"/>
+                                      </p:to>
+                                    </p:set>
+                                  </p:childTnLst>
+                                </p:cTn>
+                              </p:par>
+                            </p:childTnLst>
+                          </p:cTn>
+                        </p:par>
+                      </p:childTnLst>
+                    </p:cTn>
+                  </p:par>
+                  <p:par>
+                    <p:cTn id="79" fill="freeze">
+                      <p:stCondLst>
+                        <p:cond delay="indefinite"/>
+                      </p:stCondLst>
+                      <p:childTnLst>
+                        <p:par>
+                          <p:cTn id="80" fill="freeze">
+                            <p:stCondLst>
+                              <p:cond delay="0"/>
+                            </p:stCondLst>
+                            <p:childTnLst>
+                              <p:par>
+                                <p:cTn id="81" nodeType="clickEffect" fill="hold" presetClass="entr" presetID="1">
+                                  <p:stCondLst>
+                                    <p:cond delay="0"/>
+                                  </p:stCondLst>
+                                  <p:childTnLst>
+                                    <p:set>
+                                      <p:cBhvr>
+                                        <p:cTn id="82" dur="1" fill="hold">
+                                          <p:stCondLst>
+                                            <p:cond delay="0"/>
+                                          </p:stCondLst>
+                                        </p:cTn>
+                                        <p:tgtEl>
+                                          <p:spTgt spid="101"/>
+                                        </p:tgtEl>
+                                        <p:attrNameLst>
+                                          <p:attrName>style.visibility</p:attrName>
+                                        </p:attrNameLst>
+                                      </p:cBhvr>
+                                      <p:to>
+                                        <p:strVal val="visible"/>
+                                      </p:to>
+                                    </p:set>
+                                  </p:childTnLst>
+                                </p:cTn>
+                              </p:par>
+                              <p:par>
+                                <p:cTn id="83" nodeType="withEffect" fill="hold" presetClass="entr" presetID="1">
+                                  <p:stCondLst>
+                                    <p:cond delay="0"/>
+                                  </p:stCondLst>
+                                  <p:childTnLst>
+                                    <p:set>
+                                      <p:cBhvr>
+                                        <p:cTn id="84" dur="1" fill="hold">
+                                          <p:stCondLst>
+                                            <p:cond delay="0"/>
+                                          </p:stCondLst>
+                                        </p:cTn>
+                                        <p:tgtEl>
+                                          <p:spTgt spid="-1"/>
+                                        </p:tgtEl>
+                                        <p:attrNameLst>
+                                          <p:attrName>style.visibility</p:attrName>
+                                        </p:attrNameLst>
+                                      </p:cBhvr>
+                                      <p:to>
+                                        <p:strVal val="visible"/>
+                                      </p:to>
+                                    </p:set>
+                                  </p:childTnLst>
+                                </p:cTn>
+                              </p:par>
+                              <p:par>
+                                <p:cTn id="85" nodeType="withEffect" fill="hold" presetClass="entr" presetID="1">
+                                  <p:stCondLst>
+                                    <p:cond delay="0"/>
+                                  </p:stCondLst>
+                                  <p:childTnLst>
+                                    <p:set>
+                                      <p:cBhvr>
+                                        <p:cTn id="86" dur="1" fill="hold">
+                                          <p:stCondLst>
+                                            <p:cond delay="0"/>
+                                          </p:stCondLst>
+                                        </p:cTn>
+                                        <p:tgtEl>
+                                          <p:spTgt spid="104"/>
+                                        </p:tgtEl>
+                                        <p:attrNameLst>
+                                          <p:attrName>style.visibility</p:attrName>
+                                        </p:attrNameLst>
+                                      </p:cBhvr>
+                                      <p:to>
+                                        <p:strVal val="visible"/>
+                                      </p:to>
+                                    </p:set>
+                                  </p:childTnLst>
+                                </p:cTn>
+                              </p:par>
+                            </p:childTnLst>
+                          </p:cTn>
+                        </p:par>
+                      </p:childTnLst>
+                    </p:cTn>
+                  </p:par>
+                  <p:par>
+                    <p:cTn id="87" fill="freeze">
+                      <p:stCondLst>
+                        <p:cond delay="indefinite"/>
+                      </p:stCondLst>
+                      <p:childTnLst>
+                        <p:par>
+                          <p:cTn id="88" fill="freeze">
+                            <p:stCondLst>
+                              <p:cond delay="0"/>
+                            </p:stCondLst>
+                            <p:childTnLst>
+                              <p:par>
+                                <p:cTn id="89" nodeType="clickEffect" fill="hold" presetClass="entr" presetID="1">
+                                  <p:stCondLst>
+                                    <p:cond delay="0"/>
+                                  </p:stCondLst>
+                                  <p:childTnLst>
+                                    <p:set>
+                                      <p:cBhvr>
+                                        <p:cTn id="90" dur="1" fill="hold">
+                                          <p:stCondLst>
+                                            <p:cond delay="0"/>
+                                          </p:stCondLst>
+                                        </p:cTn>
+                                        <p:tgtEl>
+                                          <p:spTgt spid="100"/>
+                                        </p:tgtEl>
+                                        <p:attrNameLst>
+                                          <p:attrName>style.visibility</p:attrName>
+                                        </p:attrNameLst>
+                                      </p:cBhvr>
+                                      <p:to>
+                                        <p:strVal val="visible"/>
+                                      </p:to>
+                                    </p:set>
+                                  </p:childTnLst>
+                                </p:cTn>
+                              </p:par>
+                              <p:par>
+                                <p:cTn id="91" nodeType="withEffect" fill="hold" presetClass="entr" presetID="1">
+                                  <p:stCondLst>
+                                    <p:cond delay="0"/>
+                                  </p:stCondLst>
+                                  <p:childTnLst>
+                                    <p:set>
+                                      <p:cBhvr>
+                                        <p:cTn id="92" dur="1" fill="hold">
+                                          <p:stCondLst>
+                                            <p:cond delay="0"/>
+                                          </p:stCondLst>
+                                        </p:cTn>
+                                        <p:tgtEl>
+                                          <p:spTgt spid="-1"/>
+                                        </p:tgtEl>
+                                        <p:attrNameLst>
+                                          <p:attrName>style.visibility</p:attrName>
+                                        </p:attrNameLst>
+                                      </p:cBhvr>
+                                      <p:to>
+                                        <p:strVal val="visible"/>
+                                      </p:to>
+                                    </p:set>
+                                  </p:childTnLst>
+                                </p:cTn>
+                              </p:par>
+                              <p:par>
+                                <p:cTn id="93" nodeType="withEffect" fill="hold" presetClass="entr" presetID="1">
+                                  <p:stCondLst>
+                                    <p:cond delay="0"/>
+                                  </p:stCondLst>
+                                  <p:childTnLst>
+                                    <p:set>
+                                      <p:cBhvr>
+                                        <p:cTn id="94" dur="1" fill="hold">
+                                          <p:stCondLst>
+                                            <p:cond delay="0"/>
+                                          </p:stCondLst>
+                                        </p:cTn>
+                                        <p:tgtEl>
+                                          <p:spTgt spid="105"/>
+                                        </p:tgtEl>
+                                        <p:attrNameLst>
+                                          <p:attrName>style.visibility</p:attrName>
+                                        </p:attrNameLst>
+                                      </p:cBhvr>
+                                      <p:to>
+                                        <p:strVal val="visible"/>
+                                      </p:to>
+                                    </p:set>
+                                  </p:childTnLst>
+                                </p:cTn>
+                              </p:par>
+                            </p:childTnLst>
+                          </p:cTn>
+                        </p:par>
+                      </p:childTnLst>
+                    </p:cTn>
+                  </p:par>
+                </p:childTnLst>
+              </p:cTn>
               <p:prevCondLst>
                 <p:cond delay="0" evt="onPrev">
                   <p:tgtEl>
@@ -4962,7 +5567,7 @@
       </p:grpSpPr>
       <p:sp>
         <p:nvSpPr>
-          <p:cNvPr id="109" name="CustomShape 1"/>
+          <p:cNvPr id="106" name="CustomShape 1"/>
           <p:cNvSpPr/>
           <p:nvPr/>
         </p:nvSpPr>
@@ -4993,13 +5598,13 @@
       </p:sp>
       <p:sp>
         <p:nvSpPr>
-          <p:cNvPr id="110" name="TextShape 2"/>
+          <p:cNvPr id="107" name="TextShape 2"/>
           <p:cNvSpPr txBox="1"/>
           <p:nvPr/>
         </p:nvSpPr>
         <p:spPr>
           <a:xfrm>
-            <a:off x="648000" y="288000"/>
+            <a:off x="720000" y="360000"/>
             <a:ext cx="8568000" cy="1440000"/>
           </a:xfrm>
           <a:prstGeom prst="rect">
@@ -5025,13 +5630,13 @@
       </p:sp>
       <p:sp>
         <p:nvSpPr>
-          <p:cNvPr id="111" name="TextShape 3"/>
+          <p:cNvPr id="108" name="TextShape 3"/>
           <p:cNvSpPr txBox="1"/>
           <p:nvPr/>
         </p:nvSpPr>
         <p:spPr>
           <a:xfrm>
-            <a:off x="648000" y="1872000"/>
+            <a:off x="720000" y="1951200"/>
             <a:ext cx="8568000" cy="4384800"/>
           </a:xfrm>
           <a:prstGeom prst="rect">
@@ -5092,35 +5697,13 @@
       </p:sp>
       <p:sp>
         <p:nvSpPr>
-          <p:cNvPr id="112" name="Line 4"/>
-          <p:cNvSpPr/>
-          <p:nvPr/>
-        </p:nvSpPr>
-        <p:spPr>
-          <a:xfrm flipH="1" flipV="1">
-            <a:off x="6264000" y="5904000"/>
-            <a:ext cx="504000" cy="144000"/>
-          </a:xfrm>
-          <a:prstGeom prst="line">
-            <a:avLst/>
-          </a:prstGeom>
-          <a:ln>
-            <a:solidFill>
-              <a:srgbClr val="000000"/>
-            </a:solidFill>
-            <a:tailEnd len="med" type="triangle" w="med"/>
-          </a:ln>
-        </p:spPr>
-      </p:sp>
-      <p:sp>
-        <p:nvSpPr>
-          <p:cNvPr id="113" name="TextShape 5"/>
+          <p:cNvPr id="109" name="TextShape 4"/>
           <p:cNvSpPr txBox="1"/>
           <p:nvPr/>
         </p:nvSpPr>
         <p:spPr>
           <a:xfrm>
-            <a:off x="6408000" y="6049800"/>
+            <a:off x="6408000" y="6264000"/>
             <a:ext cx="2880000" cy="433440"/>
           </a:xfrm>
           <a:prstGeom prst="rect">
@@ -5149,10 +5732,286 @@
   <p:timing>
     <p:tnLst>
       <p:par>
-        <p:cTn id="51" dur="indefinite" restart="never" nodeType="tmRoot">
+        <p:cTn id="95" dur="indefinite" restart="never" nodeType="tmRoot">
           <p:childTnLst>
             <p:seq>
-              <p:cTn id="52" nodeType="mainSeq"/>
+              <p:cTn id="96" nodeType="mainSeq">
+                <p:childTnLst>
+                  <p:par>
+                    <p:cTn id="97" fill="freeze">
+                      <p:stCondLst>
+                        <p:cond delay="indefinite"/>
+                      </p:stCondLst>
+                      <p:childTnLst>
+                        <p:par>
+                          <p:cTn id="98" fill="freeze">
+                            <p:stCondLst>
+                              <p:cond delay="0"/>
+                            </p:stCondLst>
+                            <p:childTnLst>
+                              <p:par>
+                                <p:cTn id="99" nodeType="clickEffect" fill="hold" presetClass="entr" presetID="1">
+                                  <p:stCondLst>
+                                    <p:cond delay="0"/>
+                                  </p:stCondLst>
+                                  <p:childTnLst>
+                                    <p:set>
+                                      <p:cBhvr>
+                                        <p:cTn id="100" dur="1" fill="hold">
+                                          <p:stCondLst>
+                                            <p:cond delay="0"/>
+                                          </p:stCondLst>
+                                        </p:cTn>
+                                        <p:tgtEl>
+                                          <p:spTgt spid="108">
+                                            <p:txEl>
+                                              <p:pRg st="0" end="22"/>
+                                            </p:txEl>
+                                          </p:spTgt>
+                                        </p:tgtEl>
+                                        <p:attrNameLst>
+                                          <p:attrName>style.visibility</p:attrName>
+                                        </p:attrNameLst>
+                                      </p:cBhvr>
+                                      <p:to>
+                                        <p:strVal val="visible"/>
+                                      </p:to>
+                                    </p:set>
+                                  </p:childTnLst>
+                                </p:cTn>
+                              </p:par>
+                              <p:par>
+                                <p:cTn id="101" nodeType="withEffect" fill="hold" presetClass="entr" presetID="1">
+                                  <p:stCondLst>
+                                    <p:cond delay="0"/>
+                                  </p:stCondLst>
+                                  <p:childTnLst>
+                                    <p:set>
+                                      <p:cBhvr>
+                                        <p:cTn id="102" dur="1" fill="hold">
+                                          <p:stCondLst>
+                                            <p:cond delay="0"/>
+                                          </p:stCondLst>
+                                        </p:cTn>
+                                        <p:tgtEl>
+                                          <p:spTgt spid="-1"/>
+                                        </p:tgtEl>
+                                        <p:attrNameLst>
+                                          <p:attrName>style.visibility</p:attrName>
+                                        </p:attrNameLst>
+                                      </p:cBhvr>
+                                      <p:to>
+                                        <p:strVal val="visible"/>
+                                      </p:to>
+                                    </p:set>
+                                  </p:childTnLst>
+                                </p:cTn>
+                              </p:par>
+                            </p:childTnLst>
+                          </p:cTn>
+                        </p:par>
+                      </p:childTnLst>
+                    </p:cTn>
+                  </p:par>
+                  <p:par>
+                    <p:cTn id="103" fill="freeze">
+                      <p:stCondLst>
+                        <p:cond delay="indefinite"/>
+                      </p:stCondLst>
+                      <p:childTnLst>
+                        <p:par>
+                          <p:cTn id="104" fill="freeze">
+                            <p:stCondLst>
+                              <p:cond delay="0"/>
+                            </p:stCondLst>
+                            <p:childTnLst>
+                              <p:par>
+                                <p:cTn id="105" nodeType="clickEffect" fill="hold" presetClass="entr" presetID="1">
+                                  <p:stCondLst>
+                                    <p:cond delay="0"/>
+                                  </p:stCondLst>
+                                  <p:childTnLst>
+                                    <p:set>
+                                      <p:cBhvr>
+                                        <p:cTn id="106" dur="1" fill="hold">
+                                          <p:stCondLst>
+                                            <p:cond delay="0"/>
+                                          </p:stCondLst>
+                                        </p:cTn>
+                                        <p:tgtEl>
+                                          <p:spTgt spid="108">
+                                            <p:txEl>
+                                              <p:pRg st="24" end="67"/>
+                                            </p:txEl>
+                                          </p:spTgt>
+                                        </p:tgtEl>
+                                        <p:attrNameLst>
+                                          <p:attrName>style.visibility</p:attrName>
+                                        </p:attrNameLst>
+                                      </p:cBhvr>
+                                      <p:to>
+                                        <p:strVal val="visible"/>
+                                      </p:to>
+                                    </p:set>
+                                  </p:childTnLst>
+                                </p:cTn>
+                              </p:par>
+                            </p:childTnLst>
+                          </p:cTn>
+                        </p:par>
+                      </p:childTnLst>
+                    </p:cTn>
+                  </p:par>
+                  <p:par>
+                    <p:cTn id="107" fill="freeze">
+                      <p:stCondLst>
+                        <p:cond delay="indefinite"/>
+                      </p:stCondLst>
+                      <p:childTnLst>
+                        <p:par>
+                          <p:cTn id="108" fill="freeze">
+                            <p:stCondLst>
+                              <p:cond delay="0"/>
+                            </p:stCondLst>
+                            <p:childTnLst>
+                              <p:par>
+                                <p:cTn id="109" nodeType="clickEffect" fill="hold" presetClass="entr" presetID="1">
+                                  <p:stCondLst>
+                                    <p:cond delay="0"/>
+                                  </p:stCondLst>
+                                  <p:childTnLst>
+                                    <p:set>
+                                      <p:cBhvr>
+                                        <p:cTn id="110" dur="1" fill="hold">
+                                          <p:stCondLst>
+                                            <p:cond delay="0"/>
+                                          </p:stCondLst>
+                                        </p:cTn>
+                                        <p:tgtEl>
+                                          <p:spTgt spid="-1"/>
+                                        </p:tgtEl>
+                                        <p:attrNameLst>
+                                          <p:attrName>style.visibility</p:attrName>
+                                        </p:attrNameLst>
+                                      </p:cBhvr>
+                                      <p:to>
+                                        <p:strVal val="visible"/>
+                                      </p:to>
+                                    </p:set>
+                                  </p:childTnLst>
+                                </p:cTn>
+                              </p:par>
+                            </p:childTnLst>
+                          </p:cTn>
+                        </p:par>
+                      </p:childTnLst>
+                    </p:cTn>
+                  </p:par>
+                  <p:par>
+                    <p:cTn id="111" fill="freeze">
+                      <p:stCondLst>
+                        <p:cond delay="indefinite"/>
+                      </p:stCondLst>
+                      <p:childTnLst>
+                        <p:par>
+                          <p:cTn id="112" fill="freeze">
+                            <p:stCondLst>
+                              <p:cond delay="0"/>
+                            </p:stCondLst>
+                            <p:childTnLst>
+                              <p:par>
+                                <p:cTn id="113" nodeType="clickEffect" fill="hold" presetClass="entr" presetID="1">
+                                  <p:stCondLst>
+                                    <p:cond delay="0"/>
+                                  </p:stCondLst>
+                                  <p:childTnLst>
+                                    <p:set>
+                                      <p:cBhvr>
+                                        <p:cTn id="114" dur="1" fill="hold">
+                                          <p:stCondLst>
+                                            <p:cond delay="0"/>
+                                          </p:stCondLst>
+                                        </p:cTn>
+                                        <p:tgtEl>
+                                          <p:spTgt spid="106"/>
+                                        </p:tgtEl>
+                                        <p:attrNameLst>
+                                          <p:attrName>style.visibility</p:attrName>
+                                        </p:attrNameLst>
+                                      </p:cBhvr>
+                                      <p:to>
+                                        <p:strVal val="visible"/>
+                                      </p:to>
+                                    </p:set>
+                                  </p:childTnLst>
+                                </p:cTn>
+                              </p:par>
+                              <p:par>
+                                <p:cTn id="115" nodeType="withEffect" fill="hold" presetClass="entr" presetID="1">
+                                  <p:stCondLst>
+                                    <p:cond delay="0"/>
+                                  </p:stCondLst>
+                                  <p:childTnLst>
+                                    <p:set>
+                                      <p:cBhvr>
+                                        <p:cTn id="116" dur="1" fill="hold">
+                                          <p:stCondLst>
+                                            <p:cond delay="0"/>
+                                          </p:stCondLst>
+                                        </p:cTn>
+                                        <p:tgtEl>
+                                          <p:spTgt spid="-1"/>
+                                        </p:tgtEl>
+                                        <p:attrNameLst>
+                                          <p:attrName>style.visibility</p:attrName>
+                                        </p:attrNameLst>
+                                      </p:cBhvr>
+                                      <p:to>
+                                        <p:strVal val="visible"/>
+                                      </p:to>
+                                    </p:set>
+                                  </p:childTnLst>
+                                </p:cTn>
+                              </p:par>
+                              <p:par>
+                                <p:cTn id="117" nodeType="withEffect" fill="hold" presetClass="entr" presetID="1">
+                                  <p:stCondLst>
+                                    <p:cond delay="0"/>
+                                  </p:stCondLst>
+                                  <p:childTnLst>
+                                    <p:set>
+                                      <p:cBhvr>
+                                        <p:cTn id="118" dur="1" fill="hold">
+                                          <p:stCondLst>
+                                            <p:cond delay="0"/>
+                                          </p:stCondLst>
+                                        </p:cTn>
+                                        <p:tgtEl>
+                                          <p:spTgt spid="109">
+                                            <p:txEl>
+                                              <p:pRg st="0" end="13"/>
+                                            </p:txEl>
+                                          </p:spTgt>
+                                        </p:tgtEl>
+                                        <p:attrNameLst>
+                                          <p:attrName>style.visibility</p:attrName>
+                                        </p:attrNameLst>
+                                      </p:cBhvr>
+                                      <p:to>
+                                        <p:strVal val="visible"/>
+                                      </p:to>
+                                    </p:set>
+                                  </p:childTnLst>
+                                </p:cTn>
+                              </p:par>
+                            </p:childTnLst>
+                          </p:cTn>
+                        </p:par>
+                      </p:childTnLst>
+                    </p:cTn>
+                  </p:par>
+                </p:childTnLst>
+              </p:cTn>
               <p:prevCondLst>
                 <p:cond delay="0" evt="onPrev">
                   <p:tgtEl>
@@ -5195,13 +6054,13 @@
       </p:grpSpPr>
       <p:sp>
         <p:nvSpPr>
-          <p:cNvPr id="114" name="TextShape 1"/>
+          <p:cNvPr id="110" name="TextShape 1"/>
           <p:cNvSpPr txBox="1"/>
           <p:nvPr/>
         </p:nvSpPr>
         <p:spPr>
           <a:xfrm>
-            <a:off x="648000" y="288000"/>
+            <a:off x="720000" y="360000"/>
             <a:ext cx="8568000" cy="1440000"/>
           </a:xfrm>
           <a:prstGeom prst="rect">
@@ -5227,13 +6086,13 @@
       </p:sp>
       <p:sp>
         <p:nvSpPr>
-          <p:cNvPr id="115" name="TextShape 2"/>
+          <p:cNvPr id="111" name="TextShape 2"/>
           <p:cNvSpPr txBox="1"/>
           <p:nvPr/>
         </p:nvSpPr>
         <p:spPr>
           <a:xfrm>
-            <a:off x="648000" y="1872000"/>
+            <a:off x="720000" y="1951200"/>
             <a:ext cx="8568000" cy="4384800"/>
           </a:xfrm>
           <a:prstGeom prst="rect">
@@ -5328,15 +6187,538 @@
           </a:p>
         </p:txBody>
       </p:sp>
+      <p:sp>
+        <p:nvSpPr>
+          <p:cNvPr id="112" name="TextShape 3"/>
+          <p:cNvSpPr txBox="1"/>
+          <p:nvPr/>
+        </p:nvSpPr>
+        <p:spPr>
+          <a:xfrm>
+            <a:off x="5112000" y="3025800"/>
+            <a:ext cx="1728000" cy="433440"/>
+          </a:xfrm>
+          <a:prstGeom prst="rect">
+            <a:avLst/>
+          </a:prstGeom>
+          <a:noFill/>
+          <a:ln>
+            <a:noFill/>
+          </a:ln>
+        </p:spPr>
+        <p:txBody>
+          <a:bodyPr lIns="90000" rIns="90000" tIns="45000" bIns="45000"/>
+          <a:p>
+            <a:r>
+              <a:rPr lang="nl-NL" sz="2400">
+                <a:latin typeface="Arial"/>
+              </a:rPr>
+              <a:t>Frequency</a:t>
+            </a:r>
+            <a:endParaRPr/>
+          </a:p>
+        </p:txBody>
+      </p:sp>
+      <p:sp>
+        <p:nvSpPr>
+          <p:cNvPr id="113" name="TextShape 4"/>
+          <p:cNvSpPr txBox="1"/>
+          <p:nvPr/>
+        </p:nvSpPr>
+        <p:spPr>
+          <a:xfrm>
+            <a:off x="5184000" y="4140360"/>
+            <a:ext cx="1728000" cy="776520"/>
+          </a:xfrm>
+          <a:prstGeom prst="rect">
+            <a:avLst/>
+          </a:prstGeom>
+          <a:noFill/>
+          <a:ln>
+            <a:noFill/>
+          </a:ln>
+        </p:spPr>
+        <p:txBody>
+          <a:bodyPr lIns="90000" rIns="90000" tIns="45000" bIns="45000"/>
+          <a:p>
+            <a:r>
+              <a:rPr lang="nl-NL" sz="2400">
+                <a:latin typeface="Arial"/>
+              </a:rPr>
+              <a:t>Hammer stiffness</a:t>
+            </a:r>
+            <a:endParaRPr/>
+          </a:p>
+        </p:txBody>
+      </p:sp>
+      <p:sp>
+        <p:nvSpPr>
+          <p:cNvPr id="114" name="TextShape 5"/>
+          <p:cNvSpPr txBox="1"/>
+          <p:nvPr/>
+        </p:nvSpPr>
+        <p:spPr>
+          <a:xfrm>
+            <a:off x="5328000" y="5617800"/>
+            <a:ext cx="1944000" cy="433440"/>
+          </a:xfrm>
+          <a:prstGeom prst="rect">
+            <a:avLst/>
+          </a:prstGeom>
+          <a:noFill/>
+          <a:ln>
+            <a:noFill/>
+          </a:ln>
+        </p:spPr>
+        <p:txBody>
+          <a:bodyPr lIns="90000" rIns="90000" tIns="45000" bIns="45000"/>
+          <a:p>
+            <a:r>
+              <a:rPr lang="nl-NL" sz="2400">
+                <a:latin typeface="Arial"/>
+              </a:rPr>
+              <a:t>CFL number</a:t>
+            </a:r>
+            <a:endParaRPr/>
+          </a:p>
+        </p:txBody>
+      </p:sp>
     </p:spTree>
   </p:cSld>
   <p:timing>
     <p:tnLst>
       <p:par>
-        <p:cTn id="53" dur="indefinite" restart="never" nodeType="tmRoot">
+        <p:cTn id="119" dur="indefinite" restart="never" nodeType="tmRoot">
           <p:childTnLst>
             <p:seq>
-              <p:cTn id="54" nodeType="mainSeq"/>
+              <p:cTn id="120" nodeType="mainSeq">
+                <p:childTnLst>
+                  <p:par>
+                    <p:cTn id="121" fill="freeze">
+                      <p:stCondLst>
+                        <p:cond delay="indefinite"/>
+                      </p:stCondLst>
+                      <p:childTnLst>
+                        <p:par>
+                          <p:cTn id="122" fill="freeze">
+                            <p:stCondLst>
+                              <p:cond delay="0"/>
+                            </p:stCondLst>
+                            <p:childTnLst>
+                              <p:par>
+                                <p:cTn id="123" nodeType="clickEffect" fill="hold" presetClass="entr" presetID="1">
+                                  <p:stCondLst>
+                                    <p:cond delay="0"/>
+                                  </p:stCondLst>
+                                  <p:childTnLst>
+                                    <p:set>
+                                      <p:cBhvr>
+                                        <p:cTn id="124" dur="1" fill="hold">
+                                          <p:stCondLst>
+                                            <p:cond delay="0"/>
+                                          </p:stCondLst>
+                                        </p:cTn>
+                                        <p:tgtEl>
+                                          <p:spTgt spid="111">
+                                            <p:txEl>
+                                              <p:pRg st="0" end="32"/>
+                                            </p:txEl>
+                                          </p:spTgt>
+                                        </p:tgtEl>
+                                        <p:attrNameLst>
+                                          <p:attrName>style.visibility</p:attrName>
+                                        </p:attrNameLst>
+                                      </p:cBhvr>
+                                      <p:to>
+                                        <p:strVal val="visible"/>
+                                      </p:to>
+                                    </p:set>
+                                  </p:childTnLst>
+                                </p:cTn>
+                              </p:par>
+                            </p:childTnLst>
+                          </p:cTn>
+                        </p:par>
+                      </p:childTnLst>
+                    </p:cTn>
+                  </p:par>
+                  <p:par>
+                    <p:cTn id="125" fill="freeze">
+                      <p:stCondLst>
+                        <p:cond delay="indefinite"/>
+                      </p:stCondLst>
+                      <p:childTnLst>
+                        <p:par>
+                          <p:cTn id="126" fill="freeze">
+                            <p:stCondLst>
+                              <p:cond delay="0"/>
+                            </p:stCondLst>
+                            <p:childTnLst>
+                              <p:par>
+                                <p:cTn id="127" nodeType="clickEffect" fill="hold" presetClass="entr" presetID="1">
+                                  <p:stCondLst>
+                                    <p:cond delay="0"/>
+                                  </p:stCondLst>
+                                  <p:childTnLst>
+                                    <p:set>
+                                      <p:cBhvr>
+                                        <p:cTn id="128" dur="1" fill="hold">
+                                          <p:stCondLst>
+                                            <p:cond delay="0"/>
+                                          </p:stCondLst>
+                                        </p:cTn>
+                                        <p:tgtEl>
+                                          <p:spTgt spid="111">
+                                            <p:txEl>
+                                              <p:pRg st="33" end="51"/>
+                                            </p:txEl>
+                                          </p:spTgt>
+                                        </p:tgtEl>
+                                        <p:attrNameLst>
+                                          <p:attrName>style.visibility</p:attrName>
+                                        </p:attrNameLst>
+                                      </p:cBhvr>
+                                      <p:to>
+                                        <p:strVal val="visible"/>
+                                      </p:to>
+                                    </p:set>
+                                  </p:childTnLst>
+                                </p:cTn>
+                              </p:par>
+                            </p:childTnLst>
+                          </p:cTn>
+                        </p:par>
+                      </p:childTnLst>
+                    </p:cTn>
+                  </p:par>
+                  <p:par>
+                    <p:cTn id="129" fill="freeze">
+                      <p:stCondLst>
+                        <p:cond delay="indefinite"/>
+                      </p:stCondLst>
+                      <p:childTnLst>
+                        <p:par>
+                          <p:cTn id="130" fill="freeze">
+                            <p:stCondLst>
+                              <p:cond delay="0"/>
+                            </p:stCondLst>
+                            <p:childTnLst>
+                              <p:par>
+                                <p:cTn id="131" nodeType="clickEffect" fill="hold" presetClass="entr" presetID="1">
+                                  <p:stCondLst>
+                                    <p:cond delay="0"/>
+                                  </p:stCondLst>
+                                  <p:childTnLst>
+                                    <p:set>
+                                      <p:cBhvr>
+                                        <p:cTn id="132" dur="1" fill="hold">
+                                          <p:stCondLst>
+                                            <p:cond delay="0"/>
+                                          </p:stCondLst>
+                                        </p:cTn>
+                                        <p:tgtEl>
+                                          <p:spTgt spid="112">
+                                            <p:txEl>
+                                              <p:pRg st="0" end="10"/>
+                                            </p:txEl>
+                                          </p:spTgt>
+                                        </p:tgtEl>
+                                        <p:attrNameLst>
+                                          <p:attrName>style.visibility</p:attrName>
+                                        </p:attrNameLst>
+                                      </p:cBhvr>
+                                      <p:to>
+                                        <p:strVal val="visible"/>
+                                      </p:to>
+                                    </p:set>
+                                  </p:childTnLst>
+                                </p:cTn>
+                              </p:par>
+                              <p:par>
+                                <p:cTn id="133" nodeType="withEffect" fill="hold" presetClass="entr" presetID="1">
+                                  <p:stCondLst>
+                                    <p:cond delay="0"/>
+                                  </p:stCondLst>
+                                  <p:childTnLst>
+                                    <p:set>
+                                      <p:cBhvr>
+                                        <p:cTn id="134" dur="1" fill="hold">
+                                          <p:stCondLst>
+                                            <p:cond delay="0"/>
+                                          </p:stCondLst>
+                                        </p:cTn>
+                                        <p:tgtEl>
+                                          <p:spTgt spid="-1"/>
+                                        </p:tgtEl>
+                                        <p:attrNameLst>
+                                          <p:attrName>style.visibility</p:attrName>
+                                        </p:attrNameLst>
+                                      </p:cBhvr>
+                                      <p:to>
+                                        <p:strVal val="visible"/>
+                                      </p:to>
+                                    </p:set>
+                                  </p:childTnLst>
+                                </p:cTn>
+                              </p:par>
+                            </p:childTnLst>
+                          </p:cTn>
+                        </p:par>
+                      </p:childTnLst>
+                    </p:cTn>
+                  </p:par>
+                  <p:par>
+                    <p:cTn id="135" fill="freeze">
+                      <p:stCondLst>
+                        <p:cond delay="indefinite"/>
+                      </p:stCondLst>
+                      <p:childTnLst>
+                        <p:par>
+                          <p:cTn id="136" fill="freeze">
+                            <p:stCondLst>
+                              <p:cond delay="0"/>
+                            </p:stCondLst>
+                            <p:childTnLst>
+                              <p:par>
+                                <p:cTn id="137" nodeType="clickEffect" fill="hold" presetClass="entr" presetID="1">
+                                  <p:stCondLst>
+                                    <p:cond delay="0"/>
+                                  </p:stCondLst>
+                                  <p:childTnLst>
+                                    <p:set>
+                                      <p:cBhvr>
+                                        <p:cTn id="138" dur="1" fill="hold">
+                                          <p:stCondLst>
+                                            <p:cond delay="0"/>
+                                          </p:stCondLst>
+                                        </p:cTn>
+                                        <p:tgtEl>
+                                          <p:spTgt spid="111">
+                                            <p:txEl>
+                                              <p:pRg st="52" end="70"/>
+                                            </p:txEl>
+                                          </p:spTgt>
+                                        </p:tgtEl>
+                                        <p:attrNameLst>
+                                          <p:attrName>style.visibility</p:attrName>
+                                        </p:attrNameLst>
+                                      </p:cBhvr>
+                                      <p:to>
+                                        <p:strVal val="visible"/>
+                                      </p:to>
+                                    </p:set>
+                                  </p:childTnLst>
+                                </p:cTn>
+                              </p:par>
+                            </p:childTnLst>
+                          </p:cTn>
+                        </p:par>
+                      </p:childTnLst>
+                    </p:cTn>
+                  </p:par>
+                  <p:par>
+                    <p:cTn id="139" fill="freeze">
+                      <p:stCondLst>
+                        <p:cond delay="indefinite"/>
+                      </p:stCondLst>
+                      <p:childTnLst>
+                        <p:par>
+                          <p:cTn id="140" fill="freeze">
+                            <p:stCondLst>
+                              <p:cond delay="0"/>
+                            </p:stCondLst>
+                            <p:childTnLst>
+                              <p:par>
+                                <p:cTn id="141" nodeType="clickEffect" fill="hold" presetClass="entr" presetID="1">
+                                  <p:stCondLst>
+                                    <p:cond delay="0"/>
+                                  </p:stCondLst>
+                                  <p:childTnLst>
+                                    <p:set>
+                                      <p:cBhvr>
+                                        <p:cTn id="142" dur="1" fill="hold">
+                                          <p:stCondLst>
+                                            <p:cond delay="0"/>
+                                          </p:stCondLst>
+                                        </p:cTn>
+                                        <p:tgtEl>
+                                          <p:spTgt spid="113">
+                                            <p:txEl>
+                                              <p:pRg st="0" end="17"/>
+                                            </p:txEl>
+                                          </p:spTgt>
+                                        </p:tgtEl>
+                                        <p:attrNameLst>
+                                          <p:attrName>style.visibility</p:attrName>
+                                        </p:attrNameLst>
+                                      </p:cBhvr>
+                                      <p:to>
+                                        <p:strVal val="visible"/>
+                                      </p:to>
+                                    </p:set>
+                                  </p:childTnLst>
+                                </p:cTn>
+                              </p:par>
+                              <p:par>
+                                <p:cTn id="143" nodeType="withEffect" fill="hold" presetClass="entr" presetID="1">
+                                  <p:stCondLst>
+                                    <p:cond delay="0"/>
+                                  </p:stCondLst>
+                                  <p:childTnLst>
+                                    <p:set>
+                                      <p:cBhvr>
+                                        <p:cTn id="144" dur="1" fill="hold">
+                                          <p:stCondLst>
+                                            <p:cond delay="0"/>
+                                          </p:stCondLst>
+                                        </p:cTn>
+                                        <p:tgtEl>
+                                          <p:spTgt spid="-1"/>
+                                        </p:tgtEl>
+                                        <p:attrNameLst>
+                                          <p:attrName>style.visibility</p:attrName>
+                                        </p:attrNameLst>
+                                      </p:cBhvr>
+                                      <p:to>
+                                        <p:strVal val="visible"/>
+                                      </p:to>
+                                    </p:set>
+                                  </p:childTnLst>
+                                </p:cTn>
+                              </p:par>
+                            </p:childTnLst>
+                          </p:cTn>
+                        </p:par>
+                      </p:childTnLst>
+                    </p:cTn>
+                  </p:par>
+                  <p:par>
+                    <p:cTn id="145" fill="freeze">
+                      <p:stCondLst>
+                        <p:cond delay="indefinite"/>
+                      </p:stCondLst>
+                      <p:childTnLst>
+                        <p:par>
+                          <p:cTn id="146" fill="freeze">
+                            <p:stCondLst>
+                              <p:cond delay="0"/>
+                            </p:stCondLst>
+                            <p:childTnLst>
+                              <p:par>
+                                <p:cTn id="147" nodeType="clickEffect" fill="hold" presetClass="entr" presetID="1">
+                                  <p:stCondLst>
+                                    <p:cond delay="0"/>
+                                  </p:stCondLst>
+                                  <p:childTnLst>
+                                    <p:set>
+                                      <p:cBhvr>
+                                        <p:cTn id="148" dur="1" fill="hold">
+                                          <p:stCondLst>
+                                            <p:cond delay="0"/>
+                                          </p:stCondLst>
+                                        </p:cTn>
+                                        <p:tgtEl>
+                                          <p:spTgt spid="111">
+                                            <p:txEl>
+                                              <p:pRg st="71" end="92"/>
+                                            </p:txEl>
+                                          </p:spTgt>
+                                        </p:tgtEl>
+                                        <p:attrNameLst>
+                                          <p:attrName>style.visibility</p:attrName>
+                                        </p:attrNameLst>
+                                      </p:cBhvr>
+                                      <p:to>
+                                        <p:strVal val="visible"/>
+                                      </p:to>
+                                    </p:set>
+                                  </p:childTnLst>
+                                </p:cTn>
+                              </p:par>
+                            </p:childTnLst>
+                          </p:cTn>
+                        </p:par>
+                      </p:childTnLst>
+                    </p:cTn>
+                  </p:par>
+                  <p:par>
+                    <p:cTn id="149" fill="freeze">
+                      <p:stCondLst>
+                        <p:cond delay="indefinite"/>
+                      </p:stCondLst>
+                      <p:childTnLst>
+                        <p:par>
+                          <p:cTn id="150" fill="freeze">
+                            <p:stCondLst>
+                              <p:cond delay="0"/>
+                            </p:stCondLst>
+                            <p:childTnLst>
+                              <p:par>
+                                <p:cTn id="151" nodeType="clickEffect" fill="hold" presetClass="entr" presetID="1">
+                                  <p:stCondLst>
+                                    <p:cond delay="0"/>
+                                  </p:stCondLst>
+                                  <p:childTnLst>
+                                    <p:set>
+                                      <p:cBhvr>
+                                        <p:cTn id="152" dur="1" fill="hold">
+                                          <p:stCondLst>
+                                            <p:cond delay="0"/>
+                                          </p:stCondLst>
+                                        </p:cTn>
+                                        <p:tgtEl>
+                                          <p:spTgt spid="114">
+                                            <p:txEl>
+                                              <p:pRg st="0" end="11"/>
+                                            </p:txEl>
+                                          </p:spTgt>
+                                        </p:tgtEl>
+                                        <p:attrNameLst>
+                                          <p:attrName>style.visibility</p:attrName>
+                                        </p:attrNameLst>
+                                      </p:cBhvr>
+                                      <p:to>
+                                        <p:strVal val="visible"/>
+                                      </p:to>
+                                    </p:set>
+                                  </p:childTnLst>
+                                </p:cTn>
+                              </p:par>
+                              <p:par>
+                                <p:cTn id="153" nodeType="withEffect" fill="hold" presetClass="entr" presetID="1">
+                                  <p:stCondLst>
+                                    <p:cond delay="0"/>
+                                  </p:stCondLst>
+                                  <p:childTnLst>
+                                    <p:set>
+                                      <p:cBhvr>
+                                        <p:cTn id="154" dur="1" fill="hold">
+                                          <p:stCondLst>
+                                            <p:cond delay="0"/>
+                                          </p:stCondLst>
+                                        </p:cTn>
+                                        <p:tgtEl>
+                                          <p:spTgt spid="-1"/>
+                                        </p:tgtEl>
+                                        <p:attrNameLst>
+                                          <p:attrName>style.visibility</p:attrName>
+                                        </p:attrNameLst>
+                                      </p:cBhvr>
+                                      <p:to>
+                                        <p:strVal val="visible"/>
+                                      </p:to>
+                                    </p:set>
+                                  </p:childTnLst>
+                                </p:cTn>
+                              </p:par>
+                            </p:childTnLst>
+                          </p:cTn>
+                        </p:par>
+                      </p:childTnLst>
+                    </p:cTn>
+                  </p:par>
+                </p:childTnLst>
+              </p:cTn>
               <p:prevCondLst>
                 <p:cond delay="0" evt="onPrev">
                   <p:tgtEl>
@@ -5379,13 +6761,13 @@
       </p:grpSpPr>
       <p:sp>
         <p:nvSpPr>
-          <p:cNvPr id="116" name="TextShape 1"/>
+          <p:cNvPr id="115" name="TextShape 1"/>
           <p:cNvSpPr txBox="1"/>
           <p:nvPr/>
         </p:nvSpPr>
         <p:spPr>
           <a:xfrm>
-            <a:off x="648000" y="288000"/>
+            <a:off x="720000" y="360000"/>
             <a:ext cx="8568000" cy="1440000"/>
           </a:xfrm>
           <a:prstGeom prst="rect">
@@ -5403,47 +6785,44 @@
               <a:rPr b="1" lang="nl-NL" sz="4800">
                 <a:latin typeface="Open Sans"/>
               </a:rPr>
-              <a:t>Animation</a:t>
+              <a:t>'Bridge' displacement</a:t>
             </a:r>
             <a:endParaRPr/>
           </a:p>
         </p:txBody>
       </p:sp>
-      <p:sp>
-        <p:nvSpPr>
-          <p:cNvPr id="117" name="TextShape 2"/>
-          <p:cNvSpPr txBox="1"/>
+      <p:pic>
+        <p:nvPicPr>
+          <p:cNvPr id="116" name="" descr=""/>
+          <p:cNvPicPr/>
           <p:nvPr/>
-        </p:nvSpPr>
-        <p:spPr>
-          <a:xfrm>
-            <a:off x="648000" y="1872000"/>
-            <a:ext cx="8568000" cy="4384800"/>
-          </a:xfrm>
-          <a:prstGeom prst="rect">
-            <a:avLst/>
-          </a:prstGeom>
-          <a:noFill/>
+        </p:nvPicPr>
+        <p:blipFill>
+          <a:blip r:embed="rId1"/>
+          <a:stretch/>
+        </p:blipFill>
+        <p:spPr>
+          <a:xfrm>
+            <a:off x="1058040" y="1584000"/>
+            <a:ext cx="7581960" cy="5657760"/>
+          </a:xfrm>
+          <a:prstGeom prst="rect">
+            <a:avLst/>
+          </a:prstGeom>
           <a:ln>
             <a:noFill/>
           </a:ln>
         </p:spPr>
-        <p:txBody>
-          <a:bodyPr lIns="0" rIns="0" tIns="0" bIns="0"/>
-          <a:p>
-            <a:endParaRPr/>
-          </a:p>
-        </p:txBody>
-      </p:sp>
+      </p:pic>
     </p:spTree>
   </p:cSld>
   <p:timing>
     <p:tnLst>
       <p:par>
-        <p:cTn id="55" dur="indefinite" restart="never" nodeType="tmRoot">
+        <p:cTn id="155" dur="indefinite" restart="never" nodeType="tmRoot">
           <p:childTnLst>
             <p:seq>
-              <p:cTn id="56" nodeType="mainSeq"/>
+              <p:cTn id="156" nodeType="mainSeq"/>
               <p:prevCondLst>
                 <p:cond delay="0" evt="onPrev">
                   <p:tgtEl>
@@ -5486,13 +6865,13 @@
       </p:grpSpPr>
       <p:sp>
         <p:nvSpPr>
-          <p:cNvPr id="118" name="TextShape 1"/>
+          <p:cNvPr id="117" name="TextShape 1"/>
           <p:cNvSpPr txBox="1"/>
           <p:nvPr/>
         </p:nvSpPr>
         <p:spPr>
           <a:xfrm>
-            <a:off x="648000" y="288000"/>
+            <a:off x="720000" y="360000"/>
             <a:ext cx="8568000" cy="1440000"/>
           </a:xfrm>
           <a:prstGeom prst="rect">
@@ -5516,41 +6895,38 @@
           </a:p>
         </p:txBody>
       </p:sp>
-      <p:sp>
-        <p:nvSpPr>
-          <p:cNvPr id="119" name="TextShape 2"/>
-          <p:cNvSpPr txBox="1"/>
+      <p:pic>
+        <p:nvPicPr>
+          <p:cNvPr id="118" name="" descr=""/>
+          <p:cNvPicPr/>
           <p:nvPr/>
-        </p:nvSpPr>
-        <p:spPr>
-          <a:xfrm>
-            <a:off x="648000" y="1872000"/>
-            <a:ext cx="8568000" cy="4384800"/>
-          </a:xfrm>
-          <a:prstGeom prst="rect">
-            <a:avLst/>
-          </a:prstGeom>
-          <a:noFill/>
+        </p:nvPicPr>
+        <p:blipFill>
+          <a:blip r:embed="rId1"/>
+          <a:stretch/>
+        </p:blipFill>
+        <p:spPr>
+          <a:xfrm>
+            <a:off x="1440000" y="1656000"/>
+            <a:ext cx="7653960" cy="5711760"/>
+          </a:xfrm>
+          <a:prstGeom prst="rect">
+            <a:avLst/>
+          </a:prstGeom>
           <a:ln>
             <a:noFill/>
           </a:ln>
         </p:spPr>
-        <p:txBody>
-          <a:bodyPr lIns="0" rIns="0" tIns="0" bIns="0"/>
-          <a:p>
-            <a:endParaRPr/>
-          </a:p>
-        </p:txBody>
-      </p:sp>
+      </p:pic>
     </p:spTree>
   </p:cSld>
   <p:timing>
     <p:tnLst>
       <p:par>
-        <p:cTn id="57" dur="indefinite" restart="never" nodeType="tmRoot">
+        <p:cTn id="157" dur="indefinite" restart="never" nodeType="tmRoot">
           <p:childTnLst>
             <p:seq>
-              <p:cTn id="58" nodeType="mainSeq"/>
+              <p:cTn id="158" nodeType="mainSeq"/>
               <p:prevCondLst>
                 <p:cond delay="0" evt="onPrev">
                   <p:tgtEl>

</xml_diff>